<commit_message>
no Jira, cleanup programmer's solutions powerpoint
git-svn-id: https://svn.apache.org/repos/asf/uima/site/trunk/uima-website@1814656 13f79535-47bb-0310-9956-ffa450edef68
</commit_message>
<xml_diff>
--- a/docs/downloads/uv3/UIMA_V3_Programmers_Solutions.pptx
+++ b/docs/downloads/uv3/UIMA_V3_Programmers_Solutions.pptx
@@ -135,7 +135,19 @@
       </a:defRPr>
     </a:lvl9pPr>
   </p:defaultTextStyle>
+  <p:extLst>
+    <p:ext uri="{EFAFB233-063F-42B5-8137-9DF3F51BA10A}">
+      <p15:sldGuideLst xmlns:p15="http://schemas.microsoft.com/office/powerpoint/2012/main"/>
+    </p:ext>
+    <p:ext uri="{2D200454-40CA-4A62-9FC3-DE9A4176ACB9}">
+      <p15:notesGuideLst xmlns:p15="http://schemas.microsoft.com/office/powerpoint/2012/main"/>
+    </p:ext>
+  </p:extLst>
 </p:presentation>
+</file>
+
+<file path=ppt/revisionInfo.xml><?xml version="1.0" encoding="utf-8"?>
+<p1510:revInfo xmlns:a="http://schemas.openxmlformats.org/drawingml/2006/main" xmlns:r="http://schemas.openxmlformats.org/officeDocument/2006/relationships" xmlns:p1510="http://schemas.microsoft.com/office/powerpoint/2015/10/main"/>
 </file>
 
 <file path=ppt/diagrams/colors1.xml><?xml version="1.0" encoding="utf-8"?>
@@ -9597,8 +9609,8 @@
         </p:nvCxnSpPr>
         <p:spPr>
           <a:xfrm flipV="1">
-            <a:off x="2788360" y="2765043"/>
-            <a:ext cx="2157" cy="577587"/>
+            <a:off x="2790517" y="2765043"/>
+            <a:ext cx="0" cy="567533"/>
           </a:xfrm>
           <a:prstGeom prst="straightConnector1">
             <a:avLst/>
@@ -13219,8 +13231,8 @@
         </p:nvCxnSpPr>
         <p:spPr>
           <a:xfrm flipV="1">
-            <a:off x="1274469" y="2765043"/>
-            <a:ext cx="0" cy="943357"/>
+            <a:off x="1274469" y="2765044"/>
+            <a:ext cx="0" cy="930656"/>
           </a:xfrm>
           <a:prstGeom prst="straightConnector1">
             <a:avLst/>
@@ -13260,8 +13272,8 @@
         </p:nvCxnSpPr>
         <p:spPr>
           <a:xfrm flipV="1">
-            <a:off x="2167467" y="2765043"/>
-            <a:ext cx="15053" cy="968757"/>
+            <a:off x="2167467" y="2765044"/>
+            <a:ext cx="15053" cy="930656"/>
           </a:xfrm>
           <a:prstGeom prst="straightConnector1">
             <a:avLst/>
@@ -13758,6 +13770,7 @@
             </a:extLst>
           </p:cNvPr>
           <p:cNvCxnSpPr>
+            <a:cxnSpLocks/>
             <a:stCxn id="88" idx="3"/>
           </p:cNvCxnSpPr>
           <p:nvPr/>
@@ -13765,7 +13778,7 @@
         <p:spPr>
           <a:xfrm>
             <a:off x="1963446" y="3477116"/>
-            <a:ext cx="215887" cy="0"/>
+            <a:ext cx="204021" cy="0"/>
           </a:xfrm>
           <a:prstGeom prst="line">
             <a:avLst/>
@@ -13834,6 +13847,7 @@
             </a:extLst>
           </p:cNvPr>
           <p:cNvCxnSpPr>
+            <a:cxnSpLocks/>
             <a:stCxn id="86" idx="3"/>
           </p:cNvCxnSpPr>
           <p:nvPr/>
@@ -13841,7 +13855,7 @@
         <p:spPr>
           <a:xfrm>
             <a:off x="1968619" y="3106133"/>
-            <a:ext cx="198848" cy="0"/>
+            <a:ext cx="210714" cy="0"/>
           </a:xfrm>
           <a:prstGeom prst="line">
             <a:avLst/>
@@ -13878,8 +13892,8 @@
         </p:nvCxnSpPr>
         <p:spPr>
           <a:xfrm flipV="1">
-            <a:off x="2458901" y="2761857"/>
-            <a:ext cx="8244" cy="340811"/>
+            <a:off x="2467145" y="2761858"/>
+            <a:ext cx="0" cy="340810"/>
           </a:xfrm>
           <a:prstGeom prst="straightConnector1">
             <a:avLst/>
@@ -14010,14 +14024,15 @@
             </a:extLst>
           </p:cNvPr>
           <p:cNvCxnSpPr>
+            <a:cxnSpLocks/>
             <a:endCxn id="94" idx="1"/>
           </p:cNvCxnSpPr>
           <p:nvPr/>
         </p:nvCxnSpPr>
         <p:spPr>
-          <a:xfrm flipV="1">
-            <a:off x="2443523" y="3102947"/>
-            <a:ext cx="222471" cy="10053"/>
+          <a:xfrm>
+            <a:off x="2467145" y="3102947"/>
+            <a:ext cx="198849" cy="0"/>
           </a:xfrm>
           <a:prstGeom prst="line">
             <a:avLst/>
@@ -14184,14 +14199,15 @@
             </a:extLst>
           </p:cNvPr>
           <p:cNvCxnSpPr>
+            <a:cxnSpLocks/>
             <a:endCxn id="104" idx="1"/>
           </p:cNvCxnSpPr>
           <p:nvPr/>
         </p:nvCxnSpPr>
         <p:spPr>
-          <a:xfrm flipV="1">
-            <a:off x="2756455" y="3332576"/>
-            <a:ext cx="222471" cy="10053"/>
+          <a:xfrm>
+            <a:off x="2790517" y="3332576"/>
+            <a:ext cx="188409" cy="0"/>
           </a:xfrm>
           <a:prstGeom prst="line">
             <a:avLst/>
@@ -18490,14 +18506,15 @@
             </a:extLst>
           </p:cNvPr>
           <p:cNvCxnSpPr>
+            <a:cxnSpLocks/>
             <a:endCxn id="87" idx="1"/>
           </p:cNvCxnSpPr>
           <p:nvPr/>
         </p:nvCxnSpPr>
         <p:spPr>
           <a:xfrm>
-            <a:off x="3265830" y="3287521"/>
-            <a:ext cx="198039" cy="0"/>
+            <a:off x="3235349" y="3287521"/>
+            <a:ext cx="228520" cy="0"/>
           </a:xfrm>
           <a:prstGeom prst="line">
             <a:avLst/>
@@ -18612,8 +18629,8 @@
         </p:nvCxnSpPr>
         <p:spPr>
           <a:xfrm flipV="1">
-            <a:off x="3235349" y="2785363"/>
-            <a:ext cx="0" cy="540259"/>
+            <a:off x="3235349" y="2785364"/>
+            <a:ext cx="0" cy="502157"/>
           </a:xfrm>
           <a:prstGeom prst="straightConnector1">
             <a:avLst/>
@@ -22072,8 +22089,8 @@
         </p:nvCxnSpPr>
         <p:spPr>
           <a:xfrm flipV="1">
-            <a:off x="1274469" y="2765043"/>
-            <a:ext cx="0" cy="943357"/>
+            <a:off x="1274469" y="2765044"/>
+            <a:ext cx="0" cy="930656"/>
           </a:xfrm>
           <a:prstGeom prst="straightConnector1">
             <a:avLst/>
@@ -22113,8 +22130,8 @@
         </p:nvCxnSpPr>
         <p:spPr>
           <a:xfrm flipV="1">
-            <a:off x="2167467" y="2765043"/>
-            <a:ext cx="15053" cy="968757"/>
+            <a:off x="2167467" y="2765044"/>
+            <a:ext cx="15053" cy="930656"/>
           </a:xfrm>
           <a:prstGeom prst="straightConnector1">
             <a:avLst/>
@@ -22719,6 +22736,7 @@
             </a:extLst>
           </p:cNvPr>
           <p:cNvCxnSpPr>
+            <a:cxnSpLocks/>
             <a:stCxn id="86" idx="3"/>
           </p:cNvCxnSpPr>
           <p:nvPr/>
@@ -22726,7 +22744,7 @@
         <p:spPr>
           <a:xfrm>
             <a:off x="1968619" y="3106133"/>
-            <a:ext cx="198848" cy="0"/>
+            <a:ext cx="210714" cy="0"/>
           </a:xfrm>
           <a:prstGeom prst="line">
             <a:avLst/>
@@ -23182,14 +23200,14 @@
           <a:effectLst/>
           <a:extLst>
             <a:ext uri="{909E8E84-426E-40dd-AFC4-6F175D3DCCD1}">
-              <a14:hiddenFill xmlns:a14="http://schemas.microsoft.com/office/drawing/2010/main" xmlns="">
+              <a14:hiddenFill xmlns="" xmlns:a14="http://schemas.microsoft.com/office/drawing/2010/main">
                 <a:solidFill>
                   <a:schemeClr val="accent1"/>
                 </a:solidFill>
               </a14:hiddenFill>
             </a:ext>
             <a:ext uri="{91240B29-F687-4f45-9708-019B960494DF}">
-              <a14:hiddenLine xmlns:a14="http://schemas.microsoft.com/office/drawing/2010/main" xmlns="" w="9525">
+              <a14:hiddenLine xmlns="" xmlns:a14="http://schemas.microsoft.com/office/drawing/2010/main" w="9525">
                 <a:solidFill>
                   <a:schemeClr val="tx1"/>
                 </a:solidFill>
@@ -23199,7 +23217,7 @@
               </a14:hiddenLine>
             </a:ext>
             <a:ext uri="{AF507438-7753-43e0-B8FC-AC1667EBCBE1}">
-              <a14:hiddenEffects xmlns:a14="http://schemas.microsoft.com/office/drawing/2010/main" xmlns="">
+              <a14:hiddenEffects xmlns="" xmlns:a14="http://schemas.microsoft.com/office/drawing/2010/main">
                 <a:effectLst>
                   <a:outerShdw blurRad="63500" dist="38099" dir="2700000" algn="ctr" rotWithShape="0">
                     <a:schemeClr val="bg2">
@@ -23210,7 +23228,7 @@
               </a14:hiddenEffects>
             </a:ext>
             <a:ext uri="{FAA26D3D-D897-4be2-8F04-BA451C77F1D7}">
-              <ma14:placeholderFlag xmlns:ma14="http://schemas.microsoft.com/office/mac/drawingml/2011/main" xmlns="" val="1"/>
+              <ma14:placeholderFlag xmlns="" xmlns:ma14="http://schemas.microsoft.com/office/mac/drawingml/2011/main" val="1"/>
             </a:ext>
           </a:extLst>
         </p:spPr>
@@ -23364,7 +23382,7 @@
           </a:lstStyle>
           <a:p>
             <a:r>
-              <a:rPr lang="en-US" sz="3200" kern="0" dirty="0"/>
+              <a:rPr lang="en-US" sz="4000" b="0" kern="0" dirty="0"/>
               <a:t>Getting a single item</a:t>
             </a:r>
           </a:p>
@@ -23399,14 +23417,14 @@
           <a:effectLst/>
           <a:extLst>
             <a:ext uri="{909E8E84-426E-40dd-AFC4-6F175D3DCCD1}">
-              <a14:hiddenFill xmlns:a14="http://schemas.microsoft.com/office/drawing/2010/main" xmlns="">
+              <a14:hiddenFill xmlns="" xmlns:a14="http://schemas.microsoft.com/office/drawing/2010/main">
                 <a:solidFill>
                   <a:schemeClr val="accent1"/>
                 </a:solidFill>
               </a14:hiddenFill>
             </a:ext>
             <a:ext uri="{91240B29-F687-4f45-9708-019B960494DF}">
-              <a14:hiddenLine xmlns:a14="http://schemas.microsoft.com/office/drawing/2010/main" xmlns="" w="9525">
+              <a14:hiddenLine xmlns="" xmlns:a14="http://schemas.microsoft.com/office/drawing/2010/main" w="9525">
                 <a:solidFill>
                   <a:schemeClr val="tx1"/>
                 </a:solidFill>
@@ -23416,7 +23434,7 @@
               </a14:hiddenLine>
             </a:ext>
             <a:ext uri="{AF507438-7753-43e0-B8FC-AC1667EBCBE1}">
-              <a14:hiddenEffects xmlns:a14="http://schemas.microsoft.com/office/drawing/2010/main" xmlns="">
+              <a14:hiddenEffects xmlns="" xmlns:a14="http://schemas.microsoft.com/office/drawing/2010/main">
                 <a:effectLst>
                   <a:outerShdw blurRad="63500" dist="38099" dir="2700000" algn="ctr" rotWithShape="0">
                     <a:schemeClr val="bg2">
@@ -23427,7 +23445,7 @@
               </a14:hiddenEffects>
             </a:ext>
             <a:ext uri="{FAA26D3D-D897-4be2-8F04-BA451C77F1D7}">
-              <ma14:placeholderFlag xmlns:ma14="http://schemas.microsoft.com/office/mac/drawingml/2011/main" xmlns="" val="1"/>
+              <ma14:placeholderFlag xmlns="" xmlns:ma14="http://schemas.microsoft.com/office/mac/drawingml/2011/main" val="1"/>
             </a:ext>
           </a:extLst>
         </p:spPr>
@@ -23643,14 +23661,14 @@
           <a:effectLst/>
           <a:extLst>
             <a:ext uri="{909E8E84-426E-40dd-AFC4-6F175D3DCCD1}">
-              <a14:hiddenFill xmlns:a14="http://schemas.microsoft.com/office/drawing/2010/main" xmlns="">
+              <a14:hiddenFill xmlns="" xmlns:a14="http://schemas.microsoft.com/office/drawing/2010/main">
                 <a:solidFill>
                   <a:schemeClr val="accent1"/>
                 </a:solidFill>
               </a14:hiddenFill>
             </a:ext>
             <a:ext uri="{91240B29-F687-4f45-9708-019B960494DF}">
-              <a14:hiddenLine xmlns:a14="http://schemas.microsoft.com/office/drawing/2010/main" xmlns="" w="9525">
+              <a14:hiddenLine xmlns="" xmlns:a14="http://schemas.microsoft.com/office/drawing/2010/main" w="9525">
                 <a:solidFill>
                   <a:schemeClr val="tx1"/>
                 </a:solidFill>
@@ -23660,7 +23678,7 @@
               </a14:hiddenLine>
             </a:ext>
             <a:ext uri="{AF507438-7753-43e0-B8FC-AC1667EBCBE1}">
-              <a14:hiddenEffects xmlns:a14="http://schemas.microsoft.com/office/drawing/2010/main" xmlns="">
+              <a14:hiddenEffects xmlns="" xmlns:a14="http://schemas.microsoft.com/office/drawing/2010/main">
                 <a:effectLst>
                   <a:outerShdw blurRad="63500" dist="38099" dir="2700000" algn="ctr" rotWithShape="0">
                     <a:schemeClr val="bg2">
@@ -23671,7 +23689,7 @@
               </a14:hiddenEffects>
             </a:ext>
             <a:ext uri="{FAA26D3D-D897-4be2-8F04-BA451C77F1D7}">
-              <ma14:placeholderFlag xmlns:ma14="http://schemas.microsoft.com/office/mac/drawingml/2011/main" xmlns="" val="1"/>
+              <ma14:placeholderFlag xmlns="" xmlns:ma14="http://schemas.microsoft.com/office/mac/drawingml/2011/main" val="1"/>
             </a:ext>
           </a:extLst>
         </p:spPr>
@@ -23825,7 +23843,7 @@
           </a:lstStyle>
           <a:p>
             <a:r>
-              <a:rPr lang="en-US" sz="3200" kern="0" dirty="0"/>
+              <a:rPr lang="en-US" sz="4000" b="0" kern="0" dirty="0"/>
               <a:t>Getting the third item</a:t>
             </a:r>
           </a:p>
@@ -23860,14 +23878,14 @@
           <a:effectLst/>
           <a:extLst>
             <a:ext uri="{909E8E84-426E-40dd-AFC4-6F175D3DCCD1}">
-              <a14:hiddenFill xmlns:a14="http://schemas.microsoft.com/office/drawing/2010/main" xmlns="">
+              <a14:hiddenFill xmlns="" xmlns:a14="http://schemas.microsoft.com/office/drawing/2010/main">
                 <a:solidFill>
                   <a:schemeClr val="accent1"/>
                 </a:solidFill>
               </a14:hiddenFill>
             </a:ext>
             <a:ext uri="{91240B29-F687-4f45-9708-019B960494DF}">
-              <a14:hiddenLine xmlns:a14="http://schemas.microsoft.com/office/drawing/2010/main" xmlns="" w="9525">
+              <a14:hiddenLine xmlns="" xmlns:a14="http://schemas.microsoft.com/office/drawing/2010/main" w="9525">
                 <a:solidFill>
                   <a:schemeClr val="tx1"/>
                 </a:solidFill>
@@ -23877,7 +23895,7 @@
               </a14:hiddenLine>
             </a:ext>
             <a:ext uri="{AF507438-7753-43e0-B8FC-AC1667EBCBE1}">
-              <a14:hiddenEffects xmlns:a14="http://schemas.microsoft.com/office/drawing/2010/main" xmlns="">
+              <a14:hiddenEffects xmlns="" xmlns:a14="http://schemas.microsoft.com/office/drawing/2010/main">
                 <a:effectLst>
                   <a:outerShdw blurRad="63500" dist="38099" dir="2700000" algn="ctr" rotWithShape="0">
                     <a:schemeClr val="bg2">
@@ -23888,7 +23906,7 @@
               </a14:hiddenEffects>
             </a:ext>
             <a:ext uri="{FAA26D3D-D897-4be2-8F04-BA451C77F1D7}">
-              <ma14:placeholderFlag xmlns:ma14="http://schemas.microsoft.com/office/mac/drawingml/2011/main" xmlns="" val="1"/>
+              <ma14:placeholderFlag xmlns="" xmlns:ma14="http://schemas.microsoft.com/office/mac/drawingml/2011/main" val="1"/>
             </a:ext>
           </a:extLst>
         </p:spPr>
@@ -24091,7 +24109,7 @@
         </p:nvSpPr>
         <p:spPr bwMode="auto">
           <a:xfrm>
-            <a:off x="609600" y="1022350"/>
+            <a:off x="713946" y="971274"/>
             <a:ext cx="10972800" cy="427039"/>
           </a:xfrm>
           <a:prstGeom prst="rect">
@@ -24104,14 +24122,14 @@
           <a:effectLst/>
           <a:extLst>
             <a:ext uri="{909E8E84-426E-40dd-AFC4-6F175D3DCCD1}">
-              <a14:hiddenFill xmlns:a14="http://schemas.microsoft.com/office/drawing/2010/main" xmlns="">
+              <a14:hiddenFill xmlns="" xmlns:a14="http://schemas.microsoft.com/office/drawing/2010/main">
                 <a:solidFill>
                   <a:schemeClr val="accent1"/>
                 </a:solidFill>
               </a14:hiddenFill>
             </a:ext>
             <a:ext uri="{91240B29-F687-4f45-9708-019B960494DF}">
-              <a14:hiddenLine xmlns:a14="http://schemas.microsoft.com/office/drawing/2010/main" xmlns="" w="9525">
+              <a14:hiddenLine xmlns="" xmlns:a14="http://schemas.microsoft.com/office/drawing/2010/main" w="9525">
                 <a:solidFill>
                   <a:schemeClr val="tx1"/>
                 </a:solidFill>
@@ -24121,7 +24139,7 @@
               </a14:hiddenLine>
             </a:ext>
             <a:ext uri="{AF507438-7753-43e0-B8FC-AC1667EBCBE1}">
-              <a14:hiddenEffects xmlns:a14="http://schemas.microsoft.com/office/drawing/2010/main" xmlns="">
+              <a14:hiddenEffects xmlns="" xmlns:a14="http://schemas.microsoft.com/office/drawing/2010/main">
                 <a:effectLst>
                   <a:outerShdw blurRad="63500" dist="38099" dir="2700000" algn="ctr" rotWithShape="0">
                     <a:schemeClr val="bg2">
@@ -24132,7 +24150,7 @@
               </a14:hiddenEffects>
             </a:ext>
             <a:ext uri="{FAA26D3D-D897-4be2-8F04-BA451C77F1D7}">
-              <ma14:placeholderFlag xmlns:ma14="http://schemas.microsoft.com/office/mac/drawingml/2011/main" xmlns="" val="1"/>
+              <ma14:placeholderFlag xmlns="" xmlns:ma14="http://schemas.microsoft.com/office/mac/drawingml/2011/main" val="1"/>
             </a:ext>
           </a:extLst>
         </p:spPr>
@@ -24286,7 +24304,7 @@
           </a:lstStyle>
           <a:p>
             <a:r>
-              <a:rPr lang="en-US" sz="3200" kern="0" dirty="0"/>
+              <a:rPr lang="en-US" sz="4000" b="0" kern="0" dirty="0"/>
               <a:t>Getting a single FS</a:t>
             </a:r>
           </a:p>
@@ -24922,8 +24940,8 @@
         </p:nvSpPr>
         <p:spPr bwMode="auto">
           <a:xfrm>
-            <a:off x="955589" y="3390239"/>
-            <a:ext cx="4673600" cy="386323"/>
+            <a:off x="981075" y="3390239"/>
+            <a:ext cx="4648114" cy="386323"/>
           </a:xfrm>
           <a:prstGeom prst="rect">
             <a:avLst/>
@@ -24935,14 +24953,14 @@
           <a:effectLst/>
           <a:extLst>
             <a:ext uri="{909E8E84-426E-40dd-AFC4-6F175D3DCCD1}">
-              <a14:hiddenFill xmlns:a14="http://schemas.microsoft.com/office/drawing/2010/main" xmlns="">
+              <a14:hiddenFill xmlns="" xmlns:a14="http://schemas.microsoft.com/office/drawing/2010/main">
                 <a:solidFill>
                   <a:schemeClr val="accent1"/>
                 </a:solidFill>
               </a14:hiddenFill>
             </a:ext>
             <a:ext uri="{91240B29-F687-4f45-9708-019B960494DF}">
-              <a14:hiddenLine xmlns:a14="http://schemas.microsoft.com/office/drawing/2010/main" xmlns="" w="9525">
+              <a14:hiddenLine xmlns="" xmlns:a14="http://schemas.microsoft.com/office/drawing/2010/main" w="9525">
                 <a:solidFill>
                   <a:schemeClr val="tx1"/>
                 </a:solidFill>
@@ -24952,7 +24970,7 @@
               </a14:hiddenLine>
             </a:ext>
             <a:ext uri="{AF507438-7753-43e0-B8FC-AC1667EBCBE1}">
-              <a14:hiddenEffects xmlns:a14="http://schemas.microsoft.com/office/drawing/2010/main" xmlns="">
+              <a14:hiddenEffects xmlns="" xmlns:a14="http://schemas.microsoft.com/office/drawing/2010/main">
                 <a:effectLst>
                   <a:outerShdw blurRad="63500" dist="38099" dir="2700000" algn="ctr" rotWithShape="0">
                     <a:schemeClr val="bg2">
@@ -24963,7 +24981,7 @@
               </a14:hiddenEffects>
             </a:ext>
             <a:ext uri="{FAA26D3D-D897-4be2-8F04-BA451C77F1D7}">
-              <ma14:placeholderFlag xmlns:ma14="http://schemas.microsoft.com/office/mac/drawingml/2011/main" xmlns="" val="1"/>
+              <ma14:placeholderFlag xmlns="" xmlns:ma14="http://schemas.microsoft.com/office/mac/drawingml/2011/main" val="1"/>
             </a:ext>
           </a:extLst>
         </p:spPr>
@@ -25117,7 +25135,7 @@
           </a:lstStyle>
           <a:p>
             <a:r>
-              <a:rPr lang="en-US" sz="3200" kern="0" dirty="0"/>
+              <a:rPr lang="en-US" sz="4000" b="0" kern="0" dirty="0"/>
               <a:t>Following / preceding</a:t>
             </a:r>
           </a:p>
@@ -25152,14 +25170,14 @@
           <a:effectLst/>
           <a:extLst>
             <a:ext uri="{909E8E84-426E-40dd-AFC4-6F175D3DCCD1}">
-              <a14:hiddenFill xmlns:a14="http://schemas.microsoft.com/office/drawing/2010/main" xmlns="">
+              <a14:hiddenFill xmlns="" xmlns:a14="http://schemas.microsoft.com/office/drawing/2010/main">
                 <a:solidFill>
                   <a:schemeClr val="accent1"/>
                 </a:solidFill>
               </a14:hiddenFill>
             </a:ext>
             <a:ext uri="{91240B29-F687-4f45-9708-019B960494DF}">
-              <a14:hiddenLine xmlns:a14="http://schemas.microsoft.com/office/drawing/2010/main" xmlns="" w="9525">
+              <a14:hiddenLine xmlns="" xmlns:a14="http://schemas.microsoft.com/office/drawing/2010/main" w="9525">
                 <a:solidFill>
                   <a:schemeClr val="tx1"/>
                 </a:solidFill>
@@ -25169,7 +25187,7 @@
               </a14:hiddenLine>
             </a:ext>
             <a:ext uri="{AF507438-7753-43e0-B8FC-AC1667EBCBE1}">
-              <a14:hiddenEffects xmlns:a14="http://schemas.microsoft.com/office/drawing/2010/main" xmlns="">
+              <a14:hiddenEffects xmlns="" xmlns:a14="http://schemas.microsoft.com/office/drawing/2010/main">
                 <a:effectLst>
                   <a:outerShdw blurRad="63500" dist="38099" dir="2700000" algn="ctr" rotWithShape="0">
                     <a:schemeClr val="bg2">
@@ -25180,7 +25198,7 @@
               </a14:hiddenEffects>
             </a:ext>
             <a:ext uri="{FAA26D3D-D897-4be2-8F04-BA451C77F1D7}">
-              <ma14:placeholderFlag xmlns:ma14="http://schemas.microsoft.com/office/mac/drawingml/2011/main" xmlns="" val="1"/>
+              <ma14:placeholderFlag xmlns="" xmlns:ma14="http://schemas.microsoft.com/office/mac/drawingml/2011/main" val="1"/>
             </a:ext>
           </a:extLst>
         </p:spPr>
@@ -26015,7 +26033,14 @@
           <a:p>
             <a:r>
               <a:rPr lang="en-US" dirty="0"/>
-              <a:t>There’s a whole chapter with detailed instructions describing this, in the v3 user’s guide</a:t>
+              <a:t>There’s a whole chapter with detailed instructions describing this, </a:t>
+            </a:r>
+            <a:br>
+              <a:rPr lang="en-US" dirty="0"/>
+            </a:br>
+            <a:r>
+              <a:rPr lang="en-US" dirty="0"/>
+              <a:t>in the v3 user’s guide</a:t>
             </a:r>
           </a:p>
           <a:p>
@@ -26532,68 +26557,72 @@
               <a:rPr lang="en-US" dirty="0"/>
             </a:br>
             <a:r>
-              <a:rPr lang="en-US" dirty="0">
+              <a:rPr lang="en-US" sz="2400" dirty="0">
                 <a:latin typeface="Courier New" panose="02070309020205020404" pitchFamily="49" charset="0"/>
                 <a:cs typeface="Courier New" panose="02070309020205020404" pitchFamily="49" charset="0"/>
               </a:rPr>
               <a:t>&lt;import name="</a:t>
             </a:r>
             <a:r>
-              <a:rPr lang="en-US" dirty="0" err="1">
+              <a:rPr lang="en-US" sz="2400" dirty="0" err="1">
                 <a:latin typeface="Courier New" panose="02070309020205020404" pitchFamily="49" charset="0"/>
                 <a:cs typeface="Courier New" panose="02070309020205020404" pitchFamily="49" charset="0"/>
               </a:rPr>
               <a:t>org.apache.uima.semibuiltins</a:t>
             </a:r>
             <a:r>
-              <a:rPr lang="en-US" dirty="0">
+              <a:rPr lang="en-US" sz="2400" dirty="0">
                 <a:latin typeface="Courier New" panose="02070309020205020404" pitchFamily="49" charset="0"/>
                 <a:cs typeface="Courier New" panose="02070309020205020404" pitchFamily="49" charset="0"/>
               </a:rPr>
               <a:t>"/&gt;</a:t>
             </a:r>
-          </a:p>
-          <a:p>
             <a:endParaRPr lang="en-US" dirty="0">
               <a:latin typeface="Courier New" panose="02070309020205020404" pitchFamily="49" charset="0"/>
               <a:cs typeface="Courier New" panose="02070309020205020404" pitchFamily="49" charset="0"/>
             </a:endParaRPr>
           </a:p>
           <a:p>
-            <a:r>
-              <a:rPr lang="en-US" dirty="0" err="1">
+            <a:endParaRPr lang="en-US" dirty="0">
+              <a:latin typeface="Courier New" panose="02070309020205020404" pitchFamily="49" charset="0"/>
+              <a:cs typeface="Courier New" panose="02070309020205020404" pitchFamily="49" charset="0"/>
+            </a:endParaRPr>
+          </a:p>
+          <a:p>
+            <a:r>
+              <a:rPr lang="en-US" sz="2400" dirty="0" err="1">
                 <a:latin typeface="Courier New" panose="02070309020205020404" pitchFamily="49" charset="0"/>
                 <a:cs typeface="Courier New" panose="02070309020205020404" pitchFamily="49" charset="0"/>
               </a:rPr>
               <a:t>FSArrayList</a:t>
             </a:r>
-            <a:endParaRPr lang="en-US" dirty="0">
+            <a:endParaRPr lang="en-US" sz="2400" dirty="0">
               <a:latin typeface="Courier New" panose="02070309020205020404" pitchFamily="49" charset="0"/>
               <a:cs typeface="Courier New" panose="02070309020205020404" pitchFamily="49" charset="0"/>
             </a:endParaRPr>
           </a:p>
           <a:p>
             <a:r>
-              <a:rPr lang="en-US" dirty="0" err="1">
+              <a:rPr lang="en-US" sz="2400" dirty="0" err="1">
                 <a:latin typeface="Courier New" panose="02070309020205020404" pitchFamily="49" charset="0"/>
                 <a:cs typeface="Courier New" panose="02070309020205020404" pitchFamily="49" charset="0"/>
               </a:rPr>
               <a:t>FSHashSet</a:t>
             </a:r>
-            <a:endParaRPr lang="en-US" dirty="0">
+            <a:endParaRPr lang="en-US" sz="2400" dirty="0">
               <a:latin typeface="Courier New" panose="02070309020205020404" pitchFamily="49" charset="0"/>
               <a:cs typeface="Courier New" panose="02070309020205020404" pitchFamily="49" charset="0"/>
             </a:endParaRPr>
           </a:p>
           <a:p>
             <a:r>
-              <a:rPr lang="en-US" dirty="0" err="1">
+              <a:rPr lang="en-US" sz="2400" dirty="0" err="1">
                 <a:latin typeface="Courier New" panose="02070309020205020404" pitchFamily="49" charset="0"/>
                 <a:cs typeface="Courier New" panose="02070309020205020404" pitchFamily="49" charset="0"/>
               </a:rPr>
               <a:t>IntegerArrayList</a:t>
             </a:r>
-            <a:endParaRPr lang="en-US" dirty="0">
+            <a:endParaRPr lang="en-US" sz="2400" dirty="0">
               <a:latin typeface="Courier New" panose="02070309020205020404" pitchFamily="49" charset="0"/>
               <a:cs typeface="Courier New" panose="02070309020205020404" pitchFamily="49" charset="0"/>
             </a:endParaRPr>
@@ -26833,6 +26862,8 @@
                 <a:highlight>
                   <a:srgbClr val="00FF00"/>
                 </a:highlight>
+                <a:latin typeface="Courier New" panose="02070309020205020404" pitchFamily="49" charset="0"/>
+                <a:cs typeface="Courier New" panose="02070309020205020404" pitchFamily="49" charset="0"/>
               </a:rPr>
               <a:t>FSArrayList</a:t>
             </a:r>
@@ -26840,6 +26871,8 @@
               <a:highlight>
                 <a:srgbClr val="00FF00"/>
               </a:highlight>
+              <a:latin typeface="Courier New" panose="02070309020205020404" pitchFamily="49" charset="0"/>
+              <a:cs typeface="Courier New" panose="02070309020205020404" pitchFamily="49" charset="0"/>
             </a:endParaRPr>
           </a:p>
           <a:p>
@@ -27341,6 +27374,8 @@
                 <a:highlight>
                   <a:srgbClr val="00FF00"/>
                 </a:highlight>
+                <a:latin typeface="Courier New" panose="02070309020205020404" pitchFamily="49" charset="0"/>
+                <a:cs typeface="Courier New" panose="02070309020205020404" pitchFamily="49" charset="0"/>
               </a:rPr>
               <a:t>FSHashSet</a:t>
             </a:r>
@@ -27348,6 +27383,8 @@
               <a:highlight>
                 <a:srgbClr val="00FF00"/>
               </a:highlight>
+              <a:latin typeface="Courier New" panose="02070309020205020404" pitchFamily="49" charset="0"/>
+              <a:cs typeface="Courier New" panose="02070309020205020404" pitchFamily="49" charset="0"/>
             </a:endParaRPr>
           </a:p>
           <a:p>
@@ -29695,7 +29732,7 @@
         </p:nvSpPr>
         <p:spPr>
           <a:xfrm>
-            <a:off x="5180132" y="4837375"/>
+            <a:off x="5980232" y="5246950"/>
             <a:ext cx="3411277" cy="502766"/>
           </a:xfrm>
           <a:prstGeom prst="rect">
@@ -30109,12 +30146,12 @@
         <p:spPr>
           <a:xfrm>
             <a:off x="619114" y="1621535"/>
-            <a:ext cx="9012567" cy="4919941"/>
+            <a:ext cx="9544061" cy="4919941"/>
           </a:xfrm>
         </p:spPr>
         <p:txBody>
           <a:bodyPr>
-            <a:normAutofit fontScale="85000" lnSpcReduction="20000"/>
+            <a:normAutofit fontScale="85000" lnSpcReduction="10000"/>
           </a:bodyPr>
           <a:lstStyle/>
           <a:p>
@@ -33454,14 +33491,14 @@
           </a:xfrm>
           <a:extLst>
             <a:ext uri="{909E8E84-426E-40dd-AFC4-6F175D3DCCD1}">
-              <a14:hiddenFill xmlns:a14="http://schemas.microsoft.com/office/drawing/2010/main" xmlns="">
+              <a14:hiddenFill xmlns="" xmlns:a14="http://schemas.microsoft.com/office/drawing/2010/main">
                 <a:solidFill>
                   <a:schemeClr val="accent1"/>
                 </a:solidFill>
               </a14:hiddenFill>
             </a:ext>
             <a:ext uri="{91240B29-F687-4f45-9708-019B960494DF}">
-              <a14:hiddenLine xmlns:a14="http://schemas.microsoft.com/office/drawing/2010/main" xmlns="" w="9525">
+              <a14:hiddenLine xmlns="" xmlns:a14="http://schemas.microsoft.com/office/drawing/2010/main" w="9525">
                 <a:solidFill>
                   <a:schemeClr val="tx1"/>
                 </a:solidFill>
@@ -33471,7 +33508,7 @@
               </a14:hiddenLine>
             </a:ext>
             <a:ext uri="{AF507438-7753-43e0-B8FC-AC1667EBCBE1}">
-              <a14:hiddenEffects xmlns:a14="http://schemas.microsoft.com/office/drawing/2010/main" xmlns="">
+              <a14:hiddenEffects xmlns="" xmlns:a14="http://schemas.microsoft.com/office/drawing/2010/main">
                 <a:effectLst>
                   <a:outerShdw blurRad="63500" dist="38099" dir="2700000" algn="ctr" rotWithShape="0">
                     <a:schemeClr val="bg2">
@@ -33482,7 +33519,7 @@
               </a14:hiddenEffects>
             </a:ext>
             <a:ext uri="{FAA26D3D-D897-4be2-8F04-BA451C77F1D7}">
-              <ma14:placeholderFlag xmlns:ma14="http://schemas.microsoft.com/office/mac/drawingml/2011/main" xmlns="" val="1"/>
+              <ma14:placeholderFlag xmlns="" xmlns:ma14="http://schemas.microsoft.com/office/mac/drawingml/2011/main" val="1"/>
             </a:ext>
           </a:extLst>
         </p:spPr>
@@ -33625,14 +33662,14 @@
         <p:spPr>
           <a:extLst>
             <a:ext uri="{909E8E84-426E-40dd-AFC4-6F175D3DCCD1}">
-              <a14:hiddenFill xmlns:a14="http://schemas.microsoft.com/office/drawing/2010/main" xmlns="">
+              <a14:hiddenFill xmlns="" xmlns:a14="http://schemas.microsoft.com/office/drawing/2010/main">
                 <a:solidFill>
                   <a:schemeClr val="accent1"/>
                 </a:solidFill>
               </a14:hiddenFill>
             </a:ext>
             <a:ext uri="{91240B29-F687-4f45-9708-019B960494DF}">
-              <a14:hiddenLine xmlns:a14="http://schemas.microsoft.com/office/drawing/2010/main" xmlns="" w="9525">
+              <a14:hiddenLine xmlns="" xmlns:a14="http://schemas.microsoft.com/office/drawing/2010/main" w="9525">
                 <a:solidFill>
                   <a:schemeClr val="tx1"/>
                 </a:solidFill>
@@ -33642,7 +33679,7 @@
               </a14:hiddenLine>
             </a:ext>
             <a:ext uri="{AF507438-7753-43e0-B8FC-AC1667EBCBE1}">
-              <a14:hiddenEffects xmlns:a14="http://schemas.microsoft.com/office/drawing/2010/main" xmlns="">
+              <a14:hiddenEffects xmlns="" xmlns:a14="http://schemas.microsoft.com/office/drawing/2010/main">
                 <a:effectLst>
                   <a:outerShdw blurRad="63500" dist="38099" dir="2700000" algn="ctr" rotWithShape="0">
                     <a:schemeClr val="bg2">
@@ -33653,7 +33690,7 @@
               </a14:hiddenEffects>
             </a:ext>
             <a:ext uri="{FAA26D3D-D897-4be2-8F04-BA451C77F1D7}">
-              <ma14:placeholderFlag xmlns:ma14="http://schemas.microsoft.com/office/mac/drawingml/2011/main" xmlns="" val="1"/>
+              <ma14:placeholderFlag xmlns="" xmlns:ma14="http://schemas.microsoft.com/office/mac/drawingml/2011/main" val="1"/>
             </a:ext>
           </a:extLst>
         </p:spPr>
@@ -38112,8 +38149,8 @@
         </p:nvCxnSpPr>
         <p:spPr>
           <a:xfrm flipV="1">
-            <a:off x="9745947" y="3674344"/>
-            <a:ext cx="0" cy="943357"/>
+            <a:off x="9745947" y="3674345"/>
+            <a:ext cx="0" cy="930656"/>
           </a:xfrm>
           <a:prstGeom prst="straightConnector1">
             <a:avLst/>
@@ -38153,8 +38190,8 @@
         </p:nvCxnSpPr>
         <p:spPr>
           <a:xfrm flipV="1">
-            <a:off x="10638944" y="3674344"/>
-            <a:ext cx="15053" cy="968757"/>
+            <a:off x="10638944" y="3674345"/>
+            <a:ext cx="15053" cy="930656"/>
           </a:xfrm>
           <a:prstGeom prst="straightConnector1">
             <a:avLst/>
@@ -38198,6 +38235,29 @@
           <a:prstGeom prst="rect">
             <a:avLst/>
           </a:prstGeom>
+          <a:gradFill>
+            <a:gsLst>
+              <a:gs pos="0">
+                <a:schemeClr val="accent1">
+                  <a:lumMod val="40000"/>
+                  <a:lumOff val="60000"/>
+                </a:schemeClr>
+              </a:gs>
+              <a:gs pos="50000">
+                <a:schemeClr val="accent1">
+                  <a:lumMod val="60000"/>
+                  <a:lumOff val="40000"/>
+                </a:schemeClr>
+              </a:gs>
+              <a:gs pos="100000">
+                <a:schemeClr val="accent1">
+                  <a:lumMod val="99000"/>
+                  <a:satMod val="120000"/>
+                  <a:shade val="78000"/>
+                </a:schemeClr>
+              </a:gs>
+            </a:gsLst>
+          </a:gradFill>
         </p:spPr>
         <p:style>
           <a:lnRef idx="1">
@@ -38251,6 +38311,29 @@
           <a:prstGeom prst="rect">
             <a:avLst/>
           </a:prstGeom>
+          <a:gradFill>
+            <a:gsLst>
+              <a:gs pos="0">
+                <a:schemeClr val="accent1">
+                  <a:lumMod val="40000"/>
+                  <a:lumOff val="60000"/>
+                </a:schemeClr>
+              </a:gs>
+              <a:gs pos="50000">
+                <a:schemeClr val="accent1">
+                  <a:lumMod val="60000"/>
+                  <a:lumOff val="40000"/>
+                </a:schemeClr>
+              </a:gs>
+              <a:gs pos="100000">
+                <a:schemeClr val="accent1">
+                  <a:lumMod val="99000"/>
+                  <a:satMod val="120000"/>
+                  <a:shade val="78000"/>
+                </a:schemeClr>
+              </a:gs>
+            </a:gsLst>
+          </a:gradFill>
         </p:spPr>
         <p:style>
           <a:lnRef idx="1">
@@ -38305,6 +38388,29 @@
           <a:prstGeom prst="rect">
             <a:avLst/>
           </a:prstGeom>
+          <a:gradFill>
+            <a:gsLst>
+              <a:gs pos="0">
+                <a:schemeClr val="accent1">
+                  <a:lumMod val="40000"/>
+                  <a:lumOff val="60000"/>
+                </a:schemeClr>
+              </a:gs>
+              <a:gs pos="50000">
+                <a:schemeClr val="accent1">
+                  <a:lumMod val="60000"/>
+                  <a:lumOff val="40000"/>
+                </a:schemeClr>
+              </a:gs>
+              <a:gs pos="100000">
+                <a:schemeClr val="accent1">
+                  <a:lumMod val="99000"/>
+                  <a:satMod val="120000"/>
+                  <a:shade val="78000"/>
+                </a:schemeClr>
+              </a:gs>
+            </a:gsLst>
+          </a:gradFill>
         </p:spPr>
         <p:style>
           <a:lnRef idx="1">
@@ -39397,14 +39503,14 @@
           <a:effectLst/>
           <a:extLst>
             <a:ext uri="{909E8E84-426E-40dd-AFC4-6F175D3DCCD1}">
-              <a14:hiddenFill xmlns:a14="http://schemas.microsoft.com/office/drawing/2010/main" xmlns="">
+              <a14:hiddenFill xmlns="" xmlns:a14="http://schemas.microsoft.com/office/drawing/2010/main">
                 <a:solidFill>
                   <a:schemeClr val="accent1"/>
                 </a:solidFill>
               </a14:hiddenFill>
             </a:ext>
             <a:ext uri="{91240B29-F687-4f45-9708-019B960494DF}">
-              <a14:hiddenLine xmlns:a14="http://schemas.microsoft.com/office/drawing/2010/main" xmlns="" w="9525">
+              <a14:hiddenLine xmlns="" xmlns:a14="http://schemas.microsoft.com/office/drawing/2010/main" w="9525">
                 <a:solidFill>
                   <a:schemeClr val="tx1"/>
                 </a:solidFill>
@@ -39414,7 +39520,7 @@
               </a14:hiddenLine>
             </a:ext>
             <a:ext uri="{AF507438-7753-43e0-B8FC-AC1667EBCBE1}">
-              <a14:hiddenEffects xmlns:a14="http://schemas.microsoft.com/office/drawing/2010/main" xmlns="">
+              <a14:hiddenEffects xmlns="" xmlns:a14="http://schemas.microsoft.com/office/drawing/2010/main">
                 <a:effectLst>
                   <a:outerShdw blurRad="63500" dist="38099" dir="2700000" algn="ctr" rotWithShape="0">
                     <a:schemeClr val="bg2">
@@ -39425,7 +39531,7 @@
               </a14:hiddenEffects>
             </a:ext>
             <a:ext uri="{FAA26D3D-D897-4be2-8F04-BA451C77F1D7}">
-              <ma14:placeholderFlag xmlns:ma14="http://schemas.microsoft.com/office/mac/drawingml/2011/main" xmlns="" val="1"/>
+              <ma14:placeholderFlag xmlns="" xmlns:ma14="http://schemas.microsoft.com/office/mac/drawingml/2011/main" val="1"/>
             </a:ext>
           </a:extLst>
         </p:spPr>
@@ -39579,7 +39685,7 @@
           </a:lstStyle>
           <a:p>
             <a:r>
-              <a:rPr lang="en-US" sz="3200" kern="0" dirty="0"/>
+              <a:rPr lang="en-US" sz="4000" b="0" kern="0" dirty="0"/>
               <a:t>Using a sorted index</a:t>
             </a:r>
           </a:p>
@@ -39614,14 +39720,14 @@
           <a:effectLst/>
           <a:extLst>
             <a:ext uri="{909E8E84-426E-40dd-AFC4-6F175D3DCCD1}">
-              <a14:hiddenFill xmlns:a14="http://schemas.microsoft.com/office/drawing/2010/main" xmlns="">
+              <a14:hiddenFill xmlns="" xmlns:a14="http://schemas.microsoft.com/office/drawing/2010/main">
                 <a:solidFill>
                   <a:schemeClr val="accent1"/>
                 </a:solidFill>
               </a14:hiddenFill>
             </a:ext>
             <a:ext uri="{91240B29-F687-4f45-9708-019B960494DF}">
-              <a14:hiddenLine xmlns:a14="http://schemas.microsoft.com/office/drawing/2010/main" xmlns="" w="9525">
+              <a14:hiddenLine xmlns="" xmlns:a14="http://schemas.microsoft.com/office/drawing/2010/main" w="9525">
                 <a:solidFill>
                   <a:schemeClr val="tx1"/>
                 </a:solidFill>
@@ -39631,7 +39737,7 @@
               </a14:hiddenLine>
             </a:ext>
             <a:ext uri="{AF507438-7753-43e0-B8FC-AC1667EBCBE1}">
-              <a14:hiddenEffects xmlns:a14="http://schemas.microsoft.com/office/drawing/2010/main" xmlns="">
+              <a14:hiddenEffects xmlns="" xmlns:a14="http://schemas.microsoft.com/office/drawing/2010/main">
                 <a:effectLst>
                   <a:outerShdw blurRad="63500" dist="38099" dir="2700000" algn="ctr" rotWithShape="0">
                     <a:schemeClr val="bg2">
@@ -39642,7 +39748,7 @@
               </a14:hiddenEffects>
             </a:ext>
             <a:ext uri="{FAA26D3D-D897-4be2-8F04-BA451C77F1D7}">
-              <ma14:placeholderFlag xmlns:ma14="http://schemas.microsoft.com/office/mac/drawingml/2011/main" xmlns="" val="1"/>
+              <ma14:placeholderFlag xmlns="" xmlns:ma14="http://schemas.microsoft.com/office/mac/drawingml/2011/main" val="1"/>
             </a:ext>
           </a:extLst>
         </p:spPr>
@@ -39851,14 +39957,14 @@
           <a:effectLst/>
           <a:extLst>
             <a:ext uri="{909E8E84-426E-40dd-AFC4-6F175D3DCCD1}">
-              <a14:hiddenFill xmlns:a14="http://schemas.microsoft.com/office/drawing/2010/main" xmlns="">
+              <a14:hiddenFill xmlns="" xmlns:a14="http://schemas.microsoft.com/office/drawing/2010/main">
                 <a:solidFill>
                   <a:schemeClr val="accent1"/>
                 </a:solidFill>
               </a14:hiddenFill>
             </a:ext>
             <a:ext uri="{91240B29-F687-4f45-9708-019B960494DF}">
-              <a14:hiddenLine xmlns:a14="http://schemas.microsoft.com/office/drawing/2010/main" xmlns="" w="9525">
+              <a14:hiddenLine xmlns="" xmlns:a14="http://schemas.microsoft.com/office/drawing/2010/main" w="9525">
                 <a:solidFill>
                   <a:schemeClr val="tx1"/>
                 </a:solidFill>
@@ -39868,7 +39974,7 @@
               </a14:hiddenLine>
             </a:ext>
             <a:ext uri="{AF507438-7753-43e0-B8FC-AC1667EBCBE1}">
-              <a14:hiddenEffects xmlns:a14="http://schemas.microsoft.com/office/drawing/2010/main" xmlns="">
+              <a14:hiddenEffects xmlns="" xmlns:a14="http://schemas.microsoft.com/office/drawing/2010/main">
                 <a:effectLst>
                   <a:outerShdw blurRad="63500" dist="38099" dir="2700000" algn="ctr" rotWithShape="0">
                     <a:schemeClr val="bg2">
@@ -39879,7 +39985,7 @@
               </a14:hiddenEffects>
             </a:ext>
             <a:ext uri="{FAA26D3D-D897-4be2-8F04-BA451C77F1D7}">
-              <ma14:placeholderFlag xmlns:ma14="http://schemas.microsoft.com/office/mac/drawingml/2011/main" xmlns="" val="1"/>
+              <ma14:placeholderFlag xmlns="" xmlns:ma14="http://schemas.microsoft.com/office/mac/drawingml/2011/main" val="1"/>
             </a:ext>
           </a:extLst>
         </p:spPr>
@@ -40033,7 +40139,7 @@
           </a:lstStyle>
           <a:p>
             <a:r>
-              <a:rPr lang="en-US" sz="3200" kern="0" dirty="0"/>
+              <a:rPr lang="en-US" sz="4000" b="0" kern="0" dirty="0"/>
               <a:t>Both</a:t>
             </a:r>
           </a:p>
@@ -40068,14 +40174,14 @@
           <a:effectLst/>
           <a:extLst>
             <a:ext uri="{909E8E84-426E-40dd-AFC4-6F175D3DCCD1}">
-              <a14:hiddenFill xmlns:a14="http://schemas.microsoft.com/office/drawing/2010/main" xmlns="">
+              <a14:hiddenFill xmlns="" xmlns:a14="http://schemas.microsoft.com/office/drawing/2010/main">
                 <a:solidFill>
                   <a:schemeClr val="accent1"/>
                 </a:solidFill>
               </a14:hiddenFill>
             </a:ext>
             <a:ext uri="{91240B29-F687-4f45-9708-019B960494DF}">
-              <a14:hiddenLine xmlns:a14="http://schemas.microsoft.com/office/drawing/2010/main" xmlns="" w="9525">
+              <a14:hiddenLine xmlns="" xmlns:a14="http://schemas.microsoft.com/office/drawing/2010/main" w="9525">
                 <a:solidFill>
                   <a:schemeClr val="tx1"/>
                 </a:solidFill>
@@ -40085,7 +40191,7 @@
               </a14:hiddenLine>
             </a:ext>
             <a:ext uri="{AF507438-7753-43e0-B8FC-AC1667EBCBE1}">
-              <a14:hiddenEffects xmlns:a14="http://schemas.microsoft.com/office/drawing/2010/main" xmlns="">
+              <a14:hiddenEffects xmlns="" xmlns:a14="http://schemas.microsoft.com/office/drawing/2010/main">
                 <a:effectLst>
                   <a:outerShdw blurRad="63500" dist="38099" dir="2700000" algn="ctr" rotWithShape="0">
                     <a:schemeClr val="bg2">
@@ -40096,7 +40202,7 @@
               </a14:hiddenEffects>
             </a:ext>
             <a:ext uri="{FAA26D3D-D897-4be2-8F04-BA451C77F1D7}">
-              <ma14:placeholderFlag xmlns:ma14="http://schemas.microsoft.com/office/mac/drawingml/2011/main" xmlns="" val="1"/>
+              <ma14:placeholderFlag xmlns="" xmlns:ma14="http://schemas.microsoft.com/office/mac/drawingml/2011/main" val="1"/>
             </a:ext>
           </a:extLst>
         </p:spPr>
@@ -40319,14 +40425,14 @@
           <a:effectLst/>
           <a:extLst>
             <a:ext uri="{909E8E84-426E-40dd-AFC4-6F175D3DCCD1}">
-              <a14:hiddenFill xmlns:a14="http://schemas.microsoft.com/office/drawing/2010/main" xmlns="">
+              <a14:hiddenFill xmlns="" xmlns:a14="http://schemas.microsoft.com/office/drawing/2010/main">
                 <a:solidFill>
                   <a:schemeClr val="accent1"/>
                 </a:solidFill>
               </a14:hiddenFill>
             </a:ext>
             <a:ext uri="{91240B29-F687-4f45-9708-019B960494DF}">
-              <a14:hiddenLine xmlns:a14="http://schemas.microsoft.com/office/drawing/2010/main" xmlns="" w="9525">
+              <a14:hiddenLine xmlns="" xmlns:a14="http://schemas.microsoft.com/office/drawing/2010/main" w="9525">
                 <a:solidFill>
                   <a:schemeClr val="tx1"/>
                 </a:solidFill>
@@ -40336,7 +40442,7 @@
               </a14:hiddenLine>
             </a:ext>
             <a:ext uri="{AF507438-7753-43e0-B8FC-AC1667EBCBE1}">
-              <a14:hiddenEffects xmlns:a14="http://schemas.microsoft.com/office/drawing/2010/main" xmlns="">
+              <a14:hiddenEffects xmlns="" xmlns:a14="http://schemas.microsoft.com/office/drawing/2010/main">
                 <a:effectLst>
                   <a:outerShdw blurRad="63500" dist="38099" dir="2700000" algn="ctr" rotWithShape="0">
                     <a:schemeClr val="bg2">
@@ -40347,7 +40453,7 @@
               </a14:hiddenEffects>
             </a:ext>
             <a:ext uri="{FAA26D3D-D897-4be2-8F04-BA451C77F1D7}">
-              <ma14:placeholderFlag xmlns:ma14="http://schemas.microsoft.com/office/mac/drawingml/2011/main" xmlns="" val="1"/>
+              <ma14:placeholderFlag xmlns="" xmlns:ma14="http://schemas.microsoft.com/office/mac/drawingml/2011/main" val="1"/>
             </a:ext>
           </a:extLst>
         </p:spPr>

</xml_diff>

<commit_message>
update to point to beta release
git-svn-id: https://svn.apache.org/repos/asf/uima/site/trunk/uima-website@1814796 13f79535-47bb-0310-9956-ffa450edef68
</commit_message>
<xml_diff>
--- a/docs/downloads/uv3/UIMA_V3_Programmers_Solutions.pptx
+++ b/docs/downloads/uv3/UIMA_V3_Programmers_Solutions.pptx
@@ -5778,7 +5778,7 @@
           <a:p>
             <a:fld id="{D5AE7E42-DFA5-4747-B027-9C6590666EA2}" type="datetimeFigureOut">
               <a:rPr lang="en-US" smtClean="0"/>
-              <a:t>11/8/2017</a:t>
+              <a:t>11/9/2017</a:t>
             </a:fld>
             <a:endParaRPr lang="en-US"/>
           </a:p>
@@ -5955,7 +5955,7 @@
           <a:p>
             <a:fld id="{10AFCD9C-F499-4267-8C78-55E286A594BB}" type="datetimeFigureOut">
               <a:rPr lang="en-US" smtClean="0"/>
-              <a:t>11/8/2017</a:t>
+              <a:t>11/9/2017</a:t>
             </a:fld>
             <a:endParaRPr lang="en-US"/>
           </a:p>
@@ -6369,7 +6369,7 @@
           <a:p>
             <a:fld id="{5741791C-665E-4775-B64D-D30EF2B2B7B8}" type="datetime1">
               <a:rPr lang="en-US" smtClean="0"/>
-              <a:t>11/8/2017</a:t>
+              <a:t>11/9/2017</a:t>
             </a:fld>
             <a:endParaRPr lang="en-US"/>
           </a:p>
@@ -6580,7 +6580,7 @@
           <a:p>
             <a:fld id="{6E3AD883-BB4A-43E7-8B54-32F0D8E31A31}" type="datetime1">
               <a:rPr lang="en-US" smtClean="0"/>
-              <a:t>11/8/2017</a:t>
+              <a:t>11/9/2017</a:t>
             </a:fld>
             <a:endParaRPr lang="en-US"/>
           </a:p>
@@ -6910,7 +6910,7 @@
           <a:p>
             <a:fld id="{3A06DE66-39AE-4831-A32F-D50CD04A19D6}" type="datetime1">
               <a:rPr lang="en-US" smtClean="0"/>
-              <a:t>11/8/2017</a:t>
+              <a:t>11/9/2017</a:t>
             </a:fld>
             <a:endParaRPr lang="en-US" dirty="0"/>
           </a:p>
@@ -7054,7 +7054,7 @@
           <a:p>
             <a:fld id="{8FF3E4E4-9199-4F7E-8866-2F6B7F71A281}" type="datetime1">
               <a:rPr lang="en-US" smtClean="0"/>
-              <a:t>11/8/2017</a:t>
+              <a:t>11/9/2017</a:t>
             </a:fld>
             <a:endParaRPr lang="en-US"/>
           </a:p>
@@ -7359,7 +7359,7 @@
           <a:p>
             <a:fld id="{2B97D6C3-43B7-4F89-9E79-82A5A3605E61}" type="datetime1">
               <a:rPr lang="en-US" smtClean="0"/>
-              <a:t>11/8/2017</a:t>
+              <a:t>11/9/2017</a:t>
             </a:fld>
             <a:endParaRPr lang="en-US"/>
           </a:p>
@@ -7774,7 +7774,7 @@
           <a:p>
             <a:fld id="{FD0B8F11-1323-469B-AC60-FF2EF78823F9}" type="datetime1">
               <a:rPr lang="en-US" smtClean="0"/>
-              <a:t>11/8/2017</a:t>
+              <a:t>11/9/2017</a:t>
             </a:fld>
             <a:endParaRPr lang="en-US"/>
           </a:p>
@@ -7918,7 +7918,7 @@
           <a:p>
             <a:fld id="{54BBCB53-97AE-4393-A693-0DBD562BEFA5}" type="datetime1">
               <a:rPr lang="en-US" smtClean="0"/>
-              <a:t>11/8/2017</a:t>
+              <a:t>11/9/2017</a:t>
             </a:fld>
             <a:endParaRPr lang="en-US"/>
           </a:p>
@@ -8034,7 +8034,7 @@
           <a:p>
             <a:fld id="{B981CF97-F271-46FA-AFAD-B64D58C1A4A5}" type="datetime1">
               <a:rPr lang="en-US" smtClean="0"/>
-              <a:t>11/8/2017</a:t>
+              <a:t>11/9/2017</a:t>
             </a:fld>
             <a:endParaRPr lang="en-US"/>
           </a:p>
@@ -8348,7 +8348,7 @@
           <a:p>
             <a:fld id="{D54BAA09-AA03-4B31-9F17-60602C8A3204}" type="datetime1">
               <a:rPr lang="en-US" smtClean="0"/>
-              <a:t>11/8/2017</a:t>
+              <a:t>11/9/2017</a:t>
             </a:fld>
             <a:endParaRPr lang="en-US"/>
           </a:p>
@@ -8639,7 +8639,7 @@
           <a:p>
             <a:fld id="{2A77BDCF-5486-4FF1-98FC-611FE60EE5CF}" type="datetime1">
               <a:rPr lang="en-US" smtClean="0"/>
-              <a:t>11/8/2017</a:t>
+              <a:t>11/9/2017</a:t>
             </a:fld>
             <a:endParaRPr lang="en-US"/>
           </a:p>
@@ -8840,7 +8840,7 @@
           <a:p>
             <a:fld id="{EA12D9D7-0E70-4F82-B131-E2872E8691D4}" type="datetime1">
               <a:rPr lang="en-US" smtClean="0"/>
-              <a:t>11/8/2017</a:t>
+              <a:t>11/9/2017</a:t>
             </a:fld>
             <a:endParaRPr lang="en-US"/>
           </a:p>
@@ -9085,7 +9085,7 @@
           <a:p>
             <a:fld id="{5B34B120-4EAF-4826-8A44-643630AE28A7}" type="datetime1">
               <a:rPr lang="en-US" smtClean="0"/>
-              <a:t>11/8/2017</a:t>
+              <a:t>11/9/2017</a:t>
             </a:fld>
             <a:endParaRPr lang="en-US"/>
           </a:p>
@@ -9560,6 +9560,12 @@
               <a:t>Programmer’s Solutions</a:t>
             </a:r>
           </a:p>
+          <a:p>
+            <a:r>
+              <a:rPr lang="en-US" dirty="0"/>
+              <a:t>https://uima.apache.org</a:t>
+            </a:r>
+          </a:p>
         </p:txBody>
       </p:sp>
     </p:spTree>
@@ -14504,7 +14510,7 @@
           <a:p>
             <a:fld id="{AE869A3F-42FC-4A54-9A1C-B9B45A0435F5}" type="datetime1">
               <a:rPr lang="en-US" smtClean="0"/>
-              <a:t>11/8/2017</a:t>
+              <a:t>11/9/2017</a:t>
             </a:fld>
             <a:endParaRPr lang="en-US" dirty="0"/>
           </a:p>
@@ -18677,7 +18683,7 @@
           <a:p>
             <a:fld id="{74D1715A-5C75-404B-8400-C0508CBEB4BF}" type="datetime1">
               <a:rPr lang="en-US" smtClean="0"/>
-              <a:t>11/8/2017</a:t>
+              <a:t>11/9/2017</a:t>
             </a:fld>
             <a:endParaRPr lang="en-US" dirty="0"/>
           </a:p>
@@ -22788,7 +22794,7 @@
           <a:p>
             <a:fld id="{EEAB934A-3C39-4AEB-9556-80DFBB4A665D}" type="datetime1">
               <a:rPr lang="en-US" smtClean="0"/>
-              <a:t>11/8/2017</a:t>
+              <a:t>11/9/2017</a:t>
             </a:fld>
             <a:endParaRPr lang="en-US" dirty="0"/>
           </a:p>
@@ -23200,14 +23206,14 @@
           <a:effectLst/>
           <a:extLst>
             <a:ext uri="{909E8E84-426E-40dd-AFC4-6F175D3DCCD1}">
-              <a14:hiddenFill xmlns="" xmlns:a14="http://schemas.microsoft.com/office/drawing/2010/main">
+              <a14:hiddenFill xmlns:a14="http://schemas.microsoft.com/office/drawing/2010/main" xmlns="">
                 <a:solidFill>
                   <a:schemeClr val="accent1"/>
                 </a:solidFill>
               </a14:hiddenFill>
             </a:ext>
             <a:ext uri="{91240B29-F687-4f45-9708-019B960494DF}">
-              <a14:hiddenLine xmlns="" xmlns:a14="http://schemas.microsoft.com/office/drawing/2010/main" w="9525">
+              <a14:hiddenLine xmlns:a14="http://schemas.microsoft.com/office/drawing/2010/main" xmlns="" w="9525">
                 <a:solidFill>
                   <a:schemeClr val="tx1"/>
                 </a:solidFill>
@@ -23217,7 +23223,7 @@
               </a14:hiddenLine>
             </a:ext>
             <a:ext uri="{AF507438-7753-43e0-B8FC-AC1667EBCBE1}">
-              <a14:hiddenEffects xmlns="" xmlns:a14="http://schemas.microsoft.com/office/drawing/2010/main">
+              <a14:hiddenEffects xmlns:a14="http://schemas.microsoft.com/office/drawing/2010/main" xmlns="">
                 <a:effectLst>
                   <a:outerShdw blurRad="63500" dist="38099" dir="2700000" algn="ctr" rotWithShape="0">
                     <a:schemeClr val="bg2">
@@ -23228,7 +23234,7 @@
               </a14:hiddenEffects>
             </a:ext>
             <a:ext uri="{FAA26D3D-D897-4be2-8F04-BA451C77F1D7}">
-              <ma14:placeholderFlag xmlns="" xmlns:ma14="http://schemas.microsoft.com/office/mac/drawingml/2011/main" val="1"/>
+              <ma14:placeholderFlag xmlns:ma14="http://schemas.microsoft.com/office/mac/drawingml/2011/main" xmlns="" val="1"/>
             </a:ext>
           </a:extLst>
         </p:spPr>
@@ -23417,14 +23423,14 @@
           <a:effectLst/>
           <a:extLst>
             <a:ext uri="{909E8E84-426E-40dd-AFC4-6F175D3DCCD1}">
-              <a14:hiddenFill xmlns="" xmlns:a14="http://schemas.microsoft.com/office/drawing/2010/main">
+              <a14:hiddenFill xmlns:a14="http://schemas.microsoft.com/office/drawing/2010/main" xmlns="">
                 <a:solidFill>
                   <a:schemeClr val="accent1"/>
                 </a:solidFill>
               </a14:hiddenFill>
             </a:ext>
             <a:ext uri="{91240B29-F687-4f45-9708-019B960494DF}">
-              <a14:hiddenLine xmlns="" xmlns:a14="http://schemas.microsoft.com/office/drawing/2010/main" w="9525">
+              <a14:hiddenLine xmlns:a14="http://schemas.microsoft.com/office/drawing/2010/main" xmlns="" w="9525">
                 <a:solidFill>
                   <a:schemeClr val="tx1"/>
                 </a:solidFill>
@@ -23434,7 +23440,7 @@
               </a14:hiddenLine>
             </a:ext>
             <a:ext uri="{AF507438-7753-43e0-B8FC-AC1667EBCBE1}">
-              <a14:hiddenEffects xmlns="" xmlns:a14="http://schemas.microsoft.com/office/drawing/2010/main">
+              <a14:hiddenEffects xmlns:a14="http://schemas.microsoft.com/office/drawing/2010/main" xmlns="">
                 <a:effectLst>
                   <a:outerShdw blurRad="63500" dist="38099" dir="2700000" algn="ctr" rotWithShape="0">
                     <a:schemeClr val="bg2">
@@ -23445,7 +23451,7 @@
               </a14:hiddenEffects>
             </a:ext>
             <a:ext uri="{FAA26D3D-D897-4be2-8F04-BA451C77F1D7}">
-              <ma14:placeholderFlag xmlns="" xmlns:ma14="http://schemas.microsoft.com/office/mac/drawingml/2011/main" val="1"/>
+              <ma14:placeholderFlag xmlns:ma14="http://schemas.microsoft.com/office/mac/drawingml/2011/main" xmlns="" val="1"/>
             </a:ext>
           </a:extLst>
         </p:spPr>
@@ -23661,14 +23667,14 @@
           <a:effectLst/>
           <a:extLst>
             <a:ext uri="{909E8E84-426E-40dd-AFC4-6F175D3DCCD1}">
-              <a14:hiddenFill xmlns="" xmlns:a14="http://schemas.microsoft.com/office/drawing/2010/main">
+              <a14:hiddenFill xmlns:a14="http://schemas.microsoft.com/office/drawing/2010/main" xmlns="">
                 <a:solidFill>
                   <a:schemeClr val="accent1"/>
                 </a:solidFill>
               </a14:hiddenFill>
             </a:ext>
             <a:ext uri="{91240B29-F687-4f45-9708-019B960494DF}">
-              <a14:hiddenLine xmlns="" xmlns:a14="http://schemas.microsoft.com/office/drawing/2010/main" w="9525">
+              <a14:hiddenLine xmlns:a14="http://schemas.microsoft.com/office/drawing/2010/main" xmlns="" w="9525">
                 <a:solidFill>
                   <a:schemeClr val="tx1"/>
                 </a:solidFill>
@@ -23678,7 +23684,7 @@
               </a14:hiddenLine>
             </a:ext>
             <a:ext uri="{AF507438-7753-43e0-B8FC-AC1667EBCBE1}">
-              <a14:hiddenEffects xmlns="" xmlns:a14="http://schemas.microsoft.com/office/drawing/2010/main">
+              <a14:hiddenEffects xmlns:a14="http://schemas.microsoft.com/office/drawing/2010/main" xmlns="">
                 <a:effectLst>
                   <a:outerShdw blurRad="63500" dist="38099" dir="2700000" algn="ctr" rotWithShape="0">
                     <a:schemeClr val="bg2">
@@ -23689,7 +23695,7 @@
               </a14:hiddenEffects>
             </a:ext>
             <a:ext uri="{FAA26D3D-D897-4be2-8F04-BA451C77F1D7}">
-              <ma14:placeholderFlag xmlns="" xmlns:ma14="http://schemas.microsoft.com/office/mac/drawingml/2011/main" val="1"/>
+              <ma14:placeholderFlag xmlns:ma14="http://schemas.microsoft.com/office/mac/drawingml/2011/main" xmlns="" val="1"/>
             </a:ext>
           </a:extLst>
         </p:spPr>
@@ -23878,14 +23884,14 @@
           <a:effectLst/>
           <a:extLst>
             <a:ext uri="{909E8E84-426E-40dd-AFC4-6F175D3DCCD1}">
-              <a14:hiddenFill xmlns="" xmlns:a14="http://schemas.microsoft.com/office/drawing/2010/main">
+              <a14:hiddenFill xmlns:a14="http://schemas.microsoft.com/office/drawing/2010/main" xmlns="">
                 <a:solidFill>
                   <a:schemeClr val="accent1"/>
                 </a:solidFill>
               </a14:hiddenFill>
             </a:ext>
             <a:ext uri="{91240B29-F687-4f45-9708-019B960494DF}">
-              <a14:hiddenLine xmlns="" xmlns:a14="http://schemas.microsoft.com/office/drawing/2010/main" w="9525">
+              <a14:hiddenLine xmlns:a14="http://schemas.microsoft.com/office/drawing/2010/main" xmlns="" w="9525">
                 <a:solidFill>
                   <a:schemeClr val="tx1"/>
                 </a:solidFill>
@@ -23895,7 +23901,7 @@
               </a14:hiddenLine>
             </a:ext>
             <a:ext uri="{AF507438-7753-43e0-B8FC-AC1667EBCBE1}">
-              <a14:hiddenEffects xmlns="" xmlns:a14="http://schemas.microsoft.com/office/drawing/2010/main">
+              <a14:hiddenEffects xmlns:a14="http://schemas.microsoft.com/office/drawing/2010/main" xmlns="">
                 <a:effectLst>
                   <a:outerShdw blurRad="63500" dist="38099" dir="2700000" algn="ctr" rotWithShape="0">
                     <a:schemeClr val="bg2">
@@ -23906,7 +23912,7 @@
               </a14:hiddenEffects>
             </a:ext>
             <a:ext uri="{FAA26D3D-D897-4be2-8F04-BA451C77F1D7}">
-              <ma14:placeholderFlag xmlns="" xmlns:ma14="http://schemas.microsoft.com/office/mac/drawingml/2011/main" val="1"/>
+              <ma14:placeholderFlag xmlns:ma14="http://schemas.microsoft.com/office/mac/drawingml/2011/main" xmlns="" val="1"/>
             </a:ext>
           </a:extLst>
         </p:spPr>
@@ -24122,14 +24128,14 @@
           <a:effectLst/>
           <a:extLst>
             <a:ext uri="{909E8E84-426E-40dd-AFC4-6F175D3DCCD1}">
-              <a14:hiddenFill xmlns="" xmlns:a14="http://schemas.microsoft.com/office/drawing/2010/main">
+              <a14:hiddenFill xmlns:a14="http://schemas.microsoft.com/office/drawing/2010/main" xmlns="">
                 <a:solidFill>
                   <a:schemeClr val="accent1"/>
                 </a:solidFill>
               </a14:hiddenFill>
             </a:ext>
             <a:ext uri="{91240B29-F687-4f45-9708-019B960494DF}">
-              <a14:hiddenLine xmlns="" xmlns:a14="http://schemas.microsoft.com/office/drawing/2010/main" w="9525">
+              <a14:hiddenLine xmlns:a14="http://schemas.microsoft.com/office/drawing/2010/main" xmlns="" w="9525">
                 <a:solidFill>
                   <a:schemeClr val="tx1"/>
                 </a:solidFill>
@@ -24139,7 +24145,7 @@
               </a14:hiddenLine>
             </a:ext>
             <a:ext uri="{AF507438-7753-43e0-B8FC-AC1667EBCBE1}">
-              <a14:hiddenEffects xmlns="" xmlns:a14="http://schemas.microsoft.com/office/drawing/2010/main">
+              <a14:hiddenEffects xmlns:a14="http://schemas.microsoft.com/office/drawing/2010/main" xmlns="">
                 <a:effectLst>
                   <a:outerShdw blurRad="63500" dist="38099" dir="2700000" algn="ctr" rotWithShape="0">
                     <a:schemeClr val="bg2">
@@ -24150,7 +24156,7 @@
               </a14:hiddenEffects>
             </a:ext>
             <a:ext uri="{FAA26D3D-D897-4be2-8F04-BA451C77F1D7}">
-              <ma14:placeholderFlag xmlns="" xmlns:ma14="http://schemas.microsoft.com/office/mac/drawingml/2011/main" val="1"/>
+              <ma14:placeholderFlag xmlns:ma14="http://schemas.microsoft.com/office/mac/drawingml/2011/main" xmlns="" val="1"/>
             </a:ext>
           </a:extLst>
         </p:spPr>
@@ -24333,7 +24339,7 @@
           <a:p>
             <a:fld id="{7497A4EB-6CF3-412F-9AC4-4CCD5D991571}" type="datetime1">
               <a:rPr lang="en-US" smtClean="0"/>
-              <a:t>11/8/2017</a:t>
+              <a:t>11/9/2017</a:t>
             </a:fld>
             <a:endParaRPr lang="en-US" dirty="0"/>
           </a:p>
@@ -24953,14 +24959,14 @@
           <a:effectLst/>
           <a:extLst>
             <a:ext uri="{909E8E84-426E-40dd-AFC4-6F175D3DCCD1}">
-              <a14:hiddenFill xmlns="" xmlns:a14="http://schemas.microsoft.com/office/drawing/2010/main">
+              <a14:hiddenFill xmlns:a14="http://schemas.microsoft.com/office/drawing/2010/main" xmlns="">
                 <a:solidFill>
                   <a:schemeClr val="accent1"/>
                 </a:solidFill>
               </a14:hiddenFill>
             </a:ext>
             <a:ext uri="{91240B29-F687-4f45-9708-019B960494DF}">
-              <a14:hiddenLine xmlns="" xmlns:a14="http://schemas.microsoft.com/office/drawing/2010/main" w="9525">
+              <a14:hiddenLine xmlns:a14="http://schemas.microsoft.com/office/drawing/2010/main" xmlns="" w="9525">
                 <a:solidFill>
                   <a:schemeClr val="tx1"/>
                 </a:solidFill>
@@ -24970,7 +24976,7 @@
               </a14:hiddenLine>
             </a:ext>
             <a:ext uri="{AF507438-7753-43e0-B8FC-AC1667EBCBE1}">
-              <a14:hiddenEffects xmlns="" xmlns:a14="http://schemas.microsoft.com/office/drawing/2010/main">
+              <a14:hiddenEffects xmlns:a14="http://schemas.microsoft.com/office/drawing/2010/main" xmlns="">
                 <a:effectLst>
                   <a:outerShdw blurRad="63500" dist="38099" dir="2700000" algn="ctr" rotWithShape="0">
                     <a:schemeClr val="bg2">
@@ -24981,7 +24987,7 @@
               </a14:hiddenEffects>
             </a:ext>
             <a:ext uri="{FAA26D3D-D897-4be2-8F04-BA451C77F1D7}">
-              <ma14:placeholderFlag xmlns="" xmlns:ma14="http://schemas.microsoft.com/office/mac/drawingml/2011/main" val="1"/>
+              <ma14:placeholderFlag xmlns:ma14="http://schemas.microsoft.com/office/mac/drawingml/2011/main" xmlns="" val="1"/>
             </a:ext>
           </a:extLst>
         </p:spPr>
@@ -25170,14 +25176,14 @@
           <a:effectLst/>
           <a:extLst>
             <a:ext uri="{909E8E84-426E-40dd-AFC4-6F175D3DCCD1}">
-              <a14:hiddenFill xmlns="" xmlns:a14="http://schemas.microsoft.com/office/drawing/2010/main">
+              <a14:hiddenFill xmlns:a14="http://schemas.microsoft.com/office/drawing/2010/main" xmlns="">
                 <a:solidFill>
                   <a:schemeClr val="accent1"/>
                 </a:solidFill>
               </a14:hiddenFill>
             </a:ext>
             <a:ext uri="{91240B29-F687-4f45-9708-019B960494DF}">
-              <a14:hiddenLine xmlns="" xmlns:a14="http://schemas.microsoft.com/office/drawing/2010/main" w="9525">
+              <a14:hiddenLine xmlns:a14="http://schemas.microsoft.com/office/drawing/2010/main" xmlns="" w="9525">
                 <a:solidFill>
                   <a:schemeClr val="tx1"/>
                 </a:solidFill>
@@ -25187,7 +25193,7 @@
               </a14:hiddenLine>
             </a:ext>
             <a:ext uri="{AF507438-7753-43e0-B8FC-AC1667EBCBE1}">
-              <a14:hiddenEffects xmlns="" xmlns:a14="http://schemas.microsoft.com/office/drawing/2010/main">
+              <a14:hiddenEffects xmlns:a14="http://schemas.microsoft.com/office/drawing/2010/main" xmlns="">
                 <a:effectLst>
                   <a:outerShdw blurRad="63500" dist="38099" dir="2700000" algn="ctr" rotWithShape="0">
                     <a:schemeClr val="bg2">
@@ -25198,7 +25204,7 @@
               </a14:hiddenEffects>
             </a:ext>
             <a:ext uri="{FAA26D3D-D897-4be2-8F04-BA451C77F1D7}">
-              <ma14:placeholderFlag xmlns="" xmlns:ma14="http://schemas.microsoft.com/office/mac/drawingml/2011/main" val="1"/>
+              <ma14:placeholderFlag xmlns:ma14="http://schemas.microsoft.com/office/mac/drawingml/2011/main" xmlns="" val="1"/>
             </a:ext>
           </a:extLst>
         </p:spPr>
@@ -25506,7 +25512,7 @@
           <a:p>
             <a:fld id="{34AE2AF4-DE00-4367-8990-2704E34BEB0B}" type="datetime1">
               <a:rPr lang="en-US" smtClean="0"/>
-              <a:t>11/8/2017</a:t>
+              <a:t>11/9/2017</a:t>
             </a:fld>
             <a:endParaRPr lang="en-US" dirty="0"/>
           </a:p>
@@ -26144,7 +26150,7 @@
           <a:p>
             <a:fld id="{C8683FA4-76EC-43D7-82C4-CDA590961A60}" type="datetime1">
               <a:rPr lang="en-US" smtClean="0"/>
-              <a:t>11/8/2017</a:t>
+              <a:t>11/9/2017</a:t>
             </a:fld>
             <a:endParaRPr lang="en-US" dirty="0"/>
           </a:p>
@@ -26725,7 +26731,7 @@
           <a:p>
             <a:fld id="{84F50ABF-7C5C-42ED-A89C-CA1887BE685D}" type="datetime1">
               <a:rPr lang="en-US" smtClean="0"/>
-              <a:t>11/8/2017</a:t>
+              <a:t>11/9/2017</a:t>
             </a:fld>
             <a:endParaRPr lang="en-US" dirty="0"/>
           </a:p>
@@ -26990,7 +26996,7 @@
           <a:p>
             <a:fld id="{AA65D2A0-D0BA-4A22-B204-528C467850F9}" type="datetime1">
               <a:rPr lang="en-US" smtClean="0"/>
-              <a:t>11/8/2017</a:t>
+              <a:t>11/9/2017</a:t>
             </a:fld>
             <a:endParaRPr lang="en-US" dirty="0"/>
           </a:p>
@@ -27498,7 +27504,7 @@
           <a:p>
             <a:fld id="{C8A8D797-C261-480E-8837-067D26D5423E}" type="datetime1">
               <a:rPr lang="en-US" smtClean="0"/>
-              <a:t>11/8/2017</a:t>
+              <a:t>11/9/2017</a:t>
             </a:fld>
             <a:endParaRPr lang="en-US" dirty="0"/>
           </a:p>
@@ -28260,7 +28266,7 @@
           <a:p>
             <a:fld id="{10685852-31F4-439C-A2F5-6D985800193A}" type="datetime1">
               <a:rPr lang="en-US" smtClean="0"/>
-              <a:t>11/8/2017</a:t>
+              <a:t>11/9/2017</a:t>
             </a:fld>
             <a:endParaRPr lang="en-US" dirty="0"/>
           </a:p>
@@ -28892,7 +28898,7 @@
           <a:p>
             <a:fld id="{28206AF7-5981-49D9-9AA4-DC60D16F6974}" type="datetime1">
               <a:rPr lang="en-US" smtClean="0"/>
-              <a:t>11/8/2017</a:t>
+              <a:t>11/9/2017</a:t>
             </a:fld>
             <a:endParaRPr lang="en-US"/>
           </a:p>
@@ -29182,7 +29188,7 @@
           <a:p>
             <a:fld id="{EF958134-0828-483C-9EEE-57B73754CD9F}" type="datetime1">
               <a:rPr lang="en-US" smtClean="0"/>
-              <a:t>11/8/2017</a:t>
+              <a:t>11/9/2017</a:t>
             </a:fld>
             <a:endParaRPr lang="en-US" dirty="0"/>
           </a:p>
@@ -29807,7 +29813,7 @@
           <a:p>
             <a:fld id="{157537AB-6057-4B8B-9830-5C45CA9D8384}" type="datetime1">
               <a:rPr lang="en-US" smtClean="0"/>
-              <a:t>11/8/2017</a:t>
+              <a:t>11/9/2017</a:t>
             </a:fld>
             <a:endParaRPr lang="en-US" dirty="0"/>
           </a:p>
@@ -30399,7 +30405,7 @@
           <a:p>
             <a:fld id="{189A320A-6C4F-4628-979D-FEE2F85D7E2C}" type="datetime1">
               <a:rPr lang="en-US" smtClean="0"/>
-              <a:t>11/8/2017</a:t>
+              <a:t>11/9/2017</a:t>
             </a:fld>
             <a:endParaRPr lang="en-US" dirty="0"/>
           </a:p>
@@ -31054,7 +31060,7 @@
           <a:p>
             <a:fld id="{A1A5F216-EF7A-4B17-AEAA-CB0C884A7D82}" type="datetime1">
               <a:rPr lang="en-US" smtClean="0"/>
-              <a:t>11/8/2017</a:t>
+              <a:t>11/9/2017</a:t>
             </a:fld>
             <a:endParaRPr lang="en-US" dirty="0"/>
           </a:p>
@@ -31798,7 +31804,7 @@
           <a:p>
             <a:fld id="{939BC27C-99A1-48D3-A757-D318F3766BD7}" type="datetime1">
               <a:rPr lang="en-US" smtClean="0"/>
-              <a:t>11/8/2017</a:t>
+              <a:t>11/9/2017</a:t>
             </a:fld>
             <a:endParaRPr lang="en-US" dirty="0"/>
           </a:p>
@@ -32867,12 +32873,41 @@
           </a:p>
         </p:txBody>
       </p:sp>
+      <p:sp>
+        <p:nvSpPr>
+          <p:cNvPr id="4" name="Date Placeholder 3">
+            <a:extLst>
+              <a:ext uri="{FF2B5EF4-FFF2-40B4-BE49-F238E27FC236}">
+                <a16:creationId xmlns:a16="http://schemas.microsoft.com/office/drawing/2014/main" id="{EBF5F5FB-AF17-43FF-BFD6-F74A6CB3D808}"/>
+              </a:ext>
+            </a:extLst>
+          </p:cNvPr>
+          <p:cNvSpPr>
+            <a:spLocks noGrp="1"/>
+          </p:cNvSpPr>
+          <p:nvPr>
+            <p:ph type="dt" sz="half" idx="12"/>
+          </p:nvPr>
+        </p:nvSpPr>
+        <p:spPr/>
+        <p:txBody>
+          <a:bodyPr/>
+          <a:lstStyle/>
+          <a:p>
+            <a:fld id="{D43EF723-9DC7-427A-944C-A22876C03062}" type="datetime1">
+              <a:rPr lang="en-US" smtClean="0"/>
+              <a:t>11/9/2017</a:t>
+            </a:fld>
+            <a:endParaRPr lang="en-US" dirty="0"/>
+          </a:p>
+        </p:txBody>
+      </p:sp>
       <p:pic>
         <p:nvPicPr>
-          <p:cNvPr id="18" name="Picture 17" descr="Screen Clipping">
-            <a:extLst>
-              <a:ext uri="{FF2B5EF4-FFF2-40B4-BE49-F238E27FC236}">
-                <a16:creationId xmlns:a16="http://schemas.microsoft.com/office/drawing/2014/main" id="{E65234C1-F7F7-4622-8855-FE2E6F8E3D2B}"/>
+          <p:cNvPr id="7" name="Picture 6">
+            <a:extLst>
+              <a:ext uri="{FF2B5EF4-FFF2-40B4-BE49-F238E27FC236}">
+                <a16:creationId xmlns:a16="http://schemas.microsoft.com/office/drawing/2014/main" id="{A2CCC7EA-7B8B-4C61-B4E2-86276B899480}"/>
               </a:ext>
             </a:extLst>
           </p:cNvPr>
@@ -32889,43 +32924,14 @@
         </p:blipFill>
         <p:spPr>
           <a:xfrm>
-            <a:off x="3602245" y="738184"/>
-            <a:ext cx="8589755" cy="5586416"/>
+            <a:off x="3758652" y="1169904"/>
+            <a:ext cx="8102519" cy="5157015"/>
           </a:xfrm>
           <a:prstGeom prst="rect">
             <a:avLst/>
           </a:prstGeom>
         </p:spPr>
       </p:pic>
-      <p:sp>
-        <p:nvSpPr>
-          <p:cNvPr id="4" name="Date Placeholder 3">
-            <a:extLst>
-              <a:ext uri="{FF2B5EF4-FFF2-40B4-BE49-F238E27FC236}">
-                <a16:creationId xmlns:a16="http://schemas.microsoft.com/office/drawing/2014/main" id="{EBF5F5FB-AF17-43FF-BFD6-F74A6CB3D808}"/>
-              </a:ext>
-            </a:extLst>
-          </p:cNvPr>
-          <p:cNvSpPr>
-            <a:spLocks noGrp="1"/>
-          </p:cNvSpPr>
-          <p:nvPr>
-            <p:ph type="dt" sz="half" idx="12"/>
-          </p:nvPr>
-        </p:nvSpPr>
-        <p:spPr/>
-        <p:txBody>
-          <a:bodyPr/>
-          <a:lstStyle/>
-          <a:p>
-            <a:fld id="{D43EF723-9DC7-427A-944C-A22876C03062}" type="datetime1">
-              <a:rPr lang="en-US" smtClean="0"/>
-              <a:t>11/8/2017</a:t>
-            </a:fld>
-            <a:endParaRPr lang="en-US" dirty="0"/>
-          </a:p>
-        </p:txBody>
-      </p:sp>
     </p:spTree>
     <p:extLst>
       <p:ext uri="{BB962C8B-B14F-4D97-AF65-F5344CB8AC3E}">
@@ -33060,7 +33066,7 @@
                                           </p:stCondLst>
                                         </p:cTn>
                                         <p:tgtEl>
-                                          <p:spTgt spid="18"/>
+                                          <p:spTgt spid="7"/>
                                         </p:tgtEl>
                                         <p:attrNameLst>
                                           <p:attrName>style.visibility</p:attrName>
@@ -33241,7 +33247,7 @@
           <a:p>
             <a:fld id="{1F9C297A-A773-438C-A189-3CB6981C78C2}" type="datetime1">
               <a:rPr lang="en-US" smtClean="0"/>
-              <a:t>11/8/2017</a:t>
+              <a:t>11/9/2017</a:t>
             </a:fld>
             <a:endParaRPr lang="en-US" dirty="0"/>
           </a:p>
@@ -33491,14 +33497,14 @@
           </a:xfrm>
           <a:extLst>
             <a:ext uri="{909E8E84-426E-40dd-AFC4-6F175D3DCCD1}">
-              <a14:hiddenFill xmlns="" xmlns:a14="http://schemas.microsoft.com/office/drawing/2010/main">
+              <a14:hiddenFill xmlns:a14="http://schemas.microsoft.com/office/drawing/2010/main" xmlns="">
                 <a:solidFill>
                   <a:schemeClr val="accent1"/>
                 </a:solidFill>
               </a14:hiddenFill>
             </a:ext>
             <a:ext uri="{91240B29-F687-4f45-9708-019B960494DF}">
-              <a14:hiddenLine xmlns="" xmlns:a14="http://schemas.microsoft.com/office/drawing/2010/main" w="9525">
+              <a14:hiddenLine xmlns:a14="http://schemas.microsoft.com/office/drawing/2010/main" xmlns="" w="9525">
                 <a:solidFill>
                   <a:schemeClr val="tx1"/>
                 </a:solidFill>
@@ -33508,7 +33514,7 @@
               </a14:hiddenLine>
             </a:ext>
             <a:ext uri="{AF507438-7753-43e0-B8FC-AC1667EBCBE1}">
-              <a14:hiddenEffects xmlns="" xmlns:a14="http://schemas.microsoft.com/office/drawing/2010/main">
+              <a14:hiddenEffects xmlns:a14="http://schemas.microsoft.com/office/drawing/2010/main" xmlns="">
                 <a:effectLst>
                   <a:outerShdw blurRad="63500" dist="38099" dir="2700000" algn="ctr" rotWithShape="0">
                     <a:schemeClr val="bg2">
@@ -33519,7 +33525,7 @@
               </a14:hiddenEffects>
             </a:ext>
             <a:ext uri="{FAA26D3D-D897-4be2-8F04-BA451C77F1D7}">
-              <ma14:placeholderFlag xmlns="" xmlns:ma14="http://schemas.microsoft.com/office/mac/drawingml/2011/main" val="1"/>
+              <ma14:placeholderFlag xmlns:ma14="http://schemas.microsoft.com/office/mac/drawingml/2011/main" xmlns="" val="1"/>
             </a:ext>
           </a:extLst>
         </p:spPr>
@@ -33662,14 +33668,14 @@
         <p:spPr>
           <a:extLst>
             <a:ext uri="{909E8E84-426E-40dd-AFC4-6F175D3DCCD1}">
-              <a14:hiddenFill xmlns="" xmlns:a14="http://schemas.microsoft.com/office/drawing/2010/main">
+              <a14:hiddenFill xmlns:a14="http://schemas.microsoft.com/office/drawing/2010/main" xmlns="">
                 <a:solidFill>
                   <a:schemeClr val="accent1"/>
                 </a:solidFill>
               </a14:hiddenFill>
             </a:ext>
             <a:ext uri="{91240B29-F687-4f45-9708-019B960494DF}">
-              <a14:hiddenLine xmlns="" xmlns:a14="http://schemas.microsoft.com/office/drawing/2010/main" w="9525">
+              <a14:hiddenLine xmlns:a14="http://schemas.microsoft.com/office/drawing/2010/main" xmlns="" w="9525">
                 <a:solidFill>
                   <a:schemeClr val="tx1"/>
                 </a:solidFill>
@@ -33679,7 +33685,7 @@
               </a14:hiddenLine>
             </a:ext>
             <a:ext uri="{AF507438-7753-43e0-B8FC-AC1667EBCBE1}">
-              <a14:hiddenEffects xmlns="" xmlns:a14="http://schemas.microsoft.com/office/drawing/2010/main">
+              <a14:hiddenEffects xmlns:a14="http://schemas.microsoft.com/office/drawing/2010/main" xmlns="">
                 <a:effectLst>
                   <a:outerShdw blurRad="63500" dist="38099" dir="2700000" algn="ctr" rotWithShape="0">
                     <a:schemeClr val="bg2">
@@ -33690,7 +33696,7 @@
               </a14:hiddenEffects>
             </a:ext>
             <a:ext uri="{FAA26D3D-D897-4be2-8F04-BA451C77F1D7}">
-              <ma14:placeholderFlag xmlns="" xmlns:ma14="http://schemas.microsoft.com/office/mac/drawingml/2011/main" val="1"/>
+              <ma14:placeholderFlag xmlns:ma14="http://schemas.microsoft.com/office/mac/drawingml/2011/main" xmlns="" val="1"/>
             </a:ext>
           </a:extLst>
         </p:spPr>
@@ -33874,7 +33880,7 @@
           <a:p>
             <a:fld id="{72B1CF7A-5115-4D9F-9AE1-8E5B13C35372}" type="datetime1">
               <a:rPr lang="en-US" smtClean="0"/>
-              <a:t>11/8/2017</a:t>
+              <a:t>11/9/2017</a:t>
             </a:fld>
             <a:endParaRPr lang="en-US" dirty="0"/>
           </a:p>
@@ -34535,7 +34541,7 @@
           <a:p>
             <a:fld id="{A943CBF3-DD08-4B43-857D-2B6E5185334E}" type="datetime1">
               <a:rPr lang="en-US" smtClean="0"/>
-              <a:t>11/8/2017</a:t>
+              <a:t>11/9/2017</a:t>
             </a:fld>
             <a:endParaRPr lang="en-US" dirty="0"/>
           </a:p>
@@ -35421,7 +35427,7 @@
           <a:p>
             <a:fld id="{EF6859CF-7BE2-491B-891B-32127F49A511}" type="datetime1">
               <a:rPr lang="en-US" smtClean="0"/>
-              <a:t>11/8/2017</a:t>
+              <a:t>11/9/2017</a:t>
             </a:fld>
             <a:endParaRPr lang="en-US" dirty="0"/>
           </a:p>
@@ -36663,7 +36669,7 @@
           <a:p>
             <a:fld id="{FFF122D3-7248-47BC-BBF9-FD7B0A466F80}" type="datetime1">
               <a:rPr lang="en-US" smtClean="0"/>
-              <a:t>11/8/2017</a:t>
+              <a:t>11/9/2017</a:t>
             </a:fld>
             <a:endParaRPr lang="en-US" dirty="0"/>
           </a:p>
@@ -38897,7 +38903,7 @@
           <a:p>
             <a:fld id="{CC59E92D-263E-422E-BF83-D1A4522EF799}" type="datetime1">
               <a:rPr lang="en-US" smtClean="0"/>
-              <a:t>11/8/2017</a:t>
+              <a:t>11/9/2017</a:t>
             </a:fld>
             <a:endParaRPr lang="en-US" dirty="0"/>
           </a:p>
@@ -39503,14 +39509,14 @@
           <a:effectLst/>
           <a:extLst>
             <a:ext uri="{909E8E84-426E-40dd-AFC4-6F175D3DCCD1}">
-              <a14:hiddenFill xmlns="" xmlns:a14="http://schemas.microsoft.com/office/drawing/2010/main">
+              <a14:hiddenFill xmlns:a14="http://schemas.microsoft.com/office/drawing/2010/main" xmlns="">
                 <a:solidFill>
                   <a:schemeClr val="accent1"/>
                 </a:solidFill>
               </a14:hiddenFill>
             </a:ext>
             <a:ext uri="{91240B29-F687-4f45-9708-019B960494DF}">
-              <a14:hiddenLine xmlns="" xmlns:a14="http://schemas.microsoft.com/office/drawing/2010/main" w="9525">
+              <a14:hiddenLine xmlns:a14="http://schemas.microsoft.com/office/drawing/2010/main" xmlns="" w="9525">
                 <a:solidFill>
                   <a:schemeClr val="tx1"/>
                 </a:solidFill>
@@ -39520,7 +39526,7 @@
               </a14:hiddenLine>
             </a:ext>
             <a:ext uri="{AF507438-7753-43e0-B8FC-AC1667EBCBE1}">
-              <a14:hiddenEffects xmlns="" xmlns:a14="http://schemas.microsoft.com/office/drawing/2010/main">
+              <a14:hiddenEffects xmlns:a14="http://schemas.microsoft.com/office/drawing/2010/main" xmlns="">
                 <a:effectLst>
                   <a:outerShdw blurRad="63500" dist="38099" dir="2700000" algn="ctr" rotWithShape="0">
                     <a:schemeClr val="bg2">
@@ -39531,7 +39537,7 @@
               </a14:hiddenEffects>
             </a:ext>
             <a:ext uri="{FAA26D3D-D897-4be2-8F04-BA451C77F1D7}">
-              <ma14:placeholderFlag xmlns="" xmlns:ma14="http://schemas.microsoft.com/office/mac/drawingml/2011/main" val="1"/>
+              <ma14:placeholderFlag xmlns:ma14="http://schemas.microsoft.com/office/mac/drawingml/2011/main" xmlns="" val="1"/>
             </a:ext>
           </a:extLst>
         </p:spPr>
@@ -39720,14 +39726,14 @@
           <a:effectLst/>
           <a:extLst>
             <a:ext uri="{909E8E84-426E-40dd-AFC4-6F175D3DCCD1}">
-              <a14:hiddenFill xmlns="" xmlns:a14="http://schemas.microsoft.com/office/drawing/2010/main">
+              <a14:hiddenFill xmlns:a14="http://schemas.microsoft.com/office/drawing/2010/main" xmlns="">
                 <a:solidFill>
                   <a:schemeClr val="accent1"/>
                 </a:solidFill>
               </a14:hiddenFill>
             </a:ext>
             <a:ext uri="{91240B29-F687-4f45-9708-019B960494DF}">
-              <a14:hiddenLine xmlns="" xmlns:a14="http://schemas.microsoft.com/office/drawing/2010/main" w="9525">
+              <a14:hiddenLine xmlns:a14="http://schemas.microsoft.com/office/drawing/2010/main" xmlns="" w="9525">
                 <a:solidFill>
                   <a:schemeClr val="tx1"/>
                 </a:solidFill>
@@ -39737,7 +39743,7 @@
               </a14:hiddenLine>
             </a:ext>
             <a:ext uri="{AF507438-7753-43e0-B8FC-AC1667EBCBE1}">
-              <a14:hiddenEffects xmlns="" xmlns:a14="http://schemas.microsoft.com/office/drawing/2010/main">
+              <a14:hiddenEffects xmlns:a14="http://schemas.microsoft.com/office/drawing/2010/main" xmlns="">
                 <a:effectLst>
                   <a:outerShdw blurRad="63500" dist="38099" dir="2700000" algn="ctr" rotWithShape="0">
                     <a:schemeClr val="bg2">
@@ -39748,7 +39754,7 @@
               </a14:hiddenEffects>
             </a:ext>
             <a:ext uri="{FAA26D3D-D897-4be2-8F04-BA451C77F1D7}">
-              <ma14:placeholderFlag xmlns="" xmlns:ma14="http://schemas.microsoft.com/office/mac/drawingml/2011/main" val="1"/>
+              <ma14:placeholderFlag xmlns:ma14="http://schemas.microsoft.com/office/mac/drawingml/2011/main" xmlns="" val="1"/>
             </a:ext>
           </a:extLst>
         </p:spPr>
@@ -39957,14 +39963,14 @@
           <a:effectLst/>
           <a:extLst>
             <a:ext uri="{909E8E84-426E-40dd-AFC4-6F175D3DCCD1}">
-              <a14:hiddenFill xmlns="" xmlns:a14="http://schemas.microsoft.com/office/drawing/2010/main">
+              <a14:hiddenFill xmlns:a14="http://schemas.microsoft.com/office/drawing/2010/main" xmlns="">
                 <a:solidFill>
                   <a:schemeClr val="accent1"/>
                 </a:solidFill>
               </a14:hiddenFill>
             </a:ext>
             <a:ext uri="{91240B29-F687-4f45-9708-019B960494DF}">
-              <a14:hiddenLine xmlns="" xmlns:a14="http://schemas.microsoft.com/office/drawing/2010/main" w="9525">
+              <a14:hiddenLine xmlns:a14="http://schemas.microsoft.com/office/drawing/2010/main" xmlns="" w="9525">
                 <a:solidFill>
                   <a:schemeClr val="tx1"/>
                 </a:solidFill>
@@ -39974,7 +39980,7 @@
               </a14:hiddenLine>
             </a:ext>
             <a:ext uri="{AF507438-7753-43e0-B8FC-AC1667EBCBE1}">
-              <a14:hiddenEffects xmlns="" xmlns:a14="http://schemas.microsoft.com/office/drawing/2010/main">
+              <a14:hiddenEffects xmlns:a14="http://schemas.microsoft.com/office/drawing/2010/main" xmlns="">
                 <a:effectLst>
                   <a:outerShdw blurRad="63500" dist="38099" dir="2700000" algn="ctr" rotWithShape="0">
                     <a:schemeClr val="bg2">
@@ -39985,7 +39991,7 @@
               </a14:hiddenEffects>
             </a:ext>
             <a:ext uri="{FAA26D3D-D897-4be2-8F04-BA451C77F1D7}">
-              <ma14:placeholderFlag xmlns="" xmlns:ma14="http://schemas.microsoft.com/office/mac/drawingml/2011/main" val="1"/>
+              <ma14:placeholderFlag xmlns:ma14="http://schemas.microsoft.com/office/mac/drawingml/2011/main" xmlns="" val="1"/>
             </a:ext>
           </a:extLst>
         </p:spPr>
@@ -40174,14 +40180,14 @@
           <a:effectLst/>
           <a:extLst>
             <a:ext uri="{909E8E84-426E-40dd-AFC4-6F175D3DCCD1}">
-              <a14:hiddenFill xmlns="" xmlns:a14="http://schemas.microsoft.com/office/drawing/2010/main">
+              <a14:hiddenFill xmlns:a14="http://schemas.microsoft.com/office/drawing/2010/main" xmlns="">
                 <a:solidFill>
                   <a:schemeClr val="accent1"/>
                 </a:solidFill>
               </a14:hiddenFill>
             </a:ext>
             <a:ext uri="{91240B29-F687-4f45-9708-019B960494DF}">
-              <a14:hiddenLine xmlns="" xmlns:a14="http://schemas.microsoft.com/office/drawing/2010/main" w="9525">
+              <a14:hiddenLine xmlns:a14="http://schemas.microsoft.com/office/drawing/2010/main" xmlns="" w="9525">
                 <a:solidFill>
                   <a:schemeClr val="tx1"/>
                 </a:solidFill>
@@ -40191,7 +40197,7 @@
               </a14:hiddenLine>
             </a:ext>
             <a:ext uri="{AF507438-7753-43e0-B8FC-AC1667EBCBE1}">
-              <a14:hiddenEffects xmlns="" xmlns:a14="http://schemas.microsoft.com/office/drawing/2010/main">
+              <a14:hiddenEffects xmlns:a14="http://schemas.microsoft.com/office/drawing/2010/main" xmlns="">
                 <a:effectLst>
                   <a:outerShdw blurRad="63500" dist="38099" dir="2700000" algn="ctr" rotWithShape="0">
                     <a:schemeClr val="bg2">
@@ -40202,7 +40208,7 @@
               </a14:hiddenEffects>
             </a:ext>
             <a:ext uri="{FAA26D3D-D897-4be2-8F04-BA451C77F1D7}">
-              <ma14:placeholderFlag xmlns="" xmlns:ma14="http://schemas.microsoft.com/office/mac/drawingml/2011/main" val="1"/>
+              <ma14:placeholderFlag xmlns:ma14="http://schemas.microsoft.com/office/mac/drawingml/2011/main" xmlns="" val="1"/>
             </a:ext>
           </a:extLst>
         </p:spPr>
@@ -40425,14 +40431,14 @@
           <a:effectLst/>
           <a:extLst>
             <a:ext uri="{909E8E84-426E-40dd-AFC4-6F175D3DCCD1}">
-              <a14:hiddenFill xmlns="" xmlns:a14="http://schemas.microsoft.com/office/drawing/2010/main">
+              <a14:hiddenFill xmlns:a14="http://schemas.microsoft.com/office/drawing/2010/main" xmlns="">
                 <a:solidFill>
                   <a:schemeClr val="accent1"/>
                 </a:solidFill>
               </a14:hiddenFill>
             </a:ext>
             <a:ext uri="{91240B29-F687-4f45-9708-019B960494DF}">
-              <a14:hiddenLine xmlns="" xmlns:a14="http://schemas.microsoft.com/office/drawing/2010/main" w="9525">
+              <a14:hiddenLine xmlns:a14="http://schemas.microsoft.com/office/drawing/2010/main" xmlns="" w="9525">
                 <a:solidFill>
                   <a:schemeClr val="tx1"/>
                 </a:solidFill>
@@ -40442,7 +40448,7 @@
               </a14:hiddenLine>
             </a:ext>
             <a:ext uri="{AF507438-7753-43e0-B8FC-AC1667EBCBE1}">
-              <a14:hiddenEffects xmlns="" xmlns:a14="http://schemas.microsoft.com/office/drawing/2010/main">
+              <a14:hiddenEffects xmlns:a14="http://schemas.microsoft.com/office/drawing/2010/main" xmlns="">
                 <a:effectLst>
                   <a:outerShdw blurRad="63500" dist="38099" dir="2700000" algn="ctr" rotWithShape="0">
                     <a:schemeClr val="bg2">
@@ -40453,7 +40459,7 @@
               </a14:hiddenEffects>
             </a:ext>
             <a:ext uri="{FAA26D3D-D897-4be2-8F04-BA451C77F1D7}">
-              <ma14:placeholderFlag xmlns="" xmlns:ma14="http://schemas.microsoft.com/office/mac/drawingml/2011/main" val="1"/>
+              <ma14:placeholderFlag xmlns:ma14="http://schemas.microsoft.com/office/mac/drawingml/2011/main" xmlns="" val="1"/>
             </a:ext>
           </a:extLst>
         </p:spPr>
@@ -40666,7 +40672,7 @@
           <a:p>
             <a:fld id="{E4F9C820-4759-47F0-AB22-A5CE1F5A5EF6}" type="datetime1">
               <a:rPr lang="en-US" smtClean="0"/>
-              <a:t>11/8/2017</a:t>
+              <a:t>11/9/2017</a:t>
             </a:fld>
             <a:endParaRPr lang="en-US" dirty="0"/>
           </a:p>
@@ -41662,7 +41668,7 @@
           <a:p>
             <a:fld id="{577B252E-48AB-4A61-9922-816B9A78CAB9}" type="datetime1">
               <a:rPr lang="en-US" smtClean="0"/>
-              <a:t>11/8/2017</a:t>
+              <a:t>11/9/2017</a:t>
             </a:fld>
             <a:endParaRPr lang="en-US" dirty="0"/>
           </a:p>

</xml_diff>

<commit_message>
restore the download info for the add-ons
git-svn-id: https://svn.apache.org/repos/asf/uima/site/trunk/uima-website@1817630 13f79535-47bb-0310-9956-ffa450edef68
</commit_message>
<xml_diff>
--- a/docs/downloads/uv3/UIMA_V3_Programmers_Solutions.pptx
+++ b/docs/downloads/uv3/UIMA_V3_Programmers_Solutions.pptx
@@ -9663,7 +9663,7 @@
         </p:nvSpPr>
         <p:spPr>
           <a:xfrm>
-            <a:off x="619113" y="970201"/>
+            <a:off x="619113" y="740860"/>
             <a:ext cx="10972800" cy="427039"/>
           </a:xfrm>
         </p:spPr>
@@ -9675,7 +9675,14 @@
           <a:p>
             <a:r>
               <a:rPr lang="en-US" sz="3600" dirty="0"/>
-              <a:t>Special kinds of select: getting FSs at a particular spot</a:t>
+              <a:t>Special kinds of select: </a:t>
+            </a:r>
+            <a:br>
+              <a:rPr lang="en-US" sz="3600" dirty="0"/>
+            </a:br>
+            <a:r>
+              <a:rPr lang="en-US" sz="3600" dirty="0"/>
+              <a:t>getting FSs within bounds of another</a:t>
             </a:r>
           </a:p>
         </p:txBody>
@@ -23282,14 +23289,14 @@
           <a:effectLst/>
           <a:extLst>
             <a:ext uri="{909E8E84-426E-40dd-AFC4-6F175D3DCCD1}">
-              <a14:hiddenFill xmlns:a14="http://schemas.microsoft.com/office/drawing/2010/main" xmlns="">
+              <a14:hiddenFill xmlns="" xmlns:a14="http://schemas.microsoft.com/office/drawing/2010/main">
                 <a:solidFill>
                   <a:schemeClr val="accent1"/>
                 </a:solidFill>
               </a14:hiddenFill>
             </a:ext>
             <a:ext uri="{91240B29-F687-4f45-9708-019B960494DF}">
-              <a14:hiddenLine xmlns:a14="http://schemas.microsoft.com/office/drawing/2010/main" xmlns="" w="9525">
+              <a14:hiddenLine xmlns="" xmlns:a14="http://schemas.microsoft.com/office/drawing/2010/main" w="9525">
                 <a:solidFill>
                   <a:schemeClr val="tx1"/>
                 </a:solidFill>
@@ -23299,7 +23306,7 @@
               </a14:hiddenLine>
             </a:ext>
             <a:ext uri="{AF507438-7753-43e0-B8FC-AC1667EBCBE1}">
-              <a14:hiddenEffects xmlns:a14="http://schemas.microsoft.com/office/drawing/2010/main" xmlns="">
+              <a14:hiddenEffects xmlns="" xmlns:a14="http://schemas.microsoft.com/office/drawing/2010/main">
                 <a:effectLst>
                   <a:outerShdw blurRad="63500" dist="38099" dir="2700000" algn="ctr" rotWithShape="0">
                     <a:schemeClr val="bg2">
@@ -23310,7 +23317,7 @@
               </a14:hiddenEffects>
             </a:ext>
             <a:ext uri="{FAA26D3D-D897-4be2-8F04-BA451C77F1D7}">
-              <ma14:placeholderFlag xmlns:ma14="http://schemas.microsoft.com/office/mac/drawingml/2011/main" xmlns="" val="1"/>
+              <ma14:placeholderFlag xmlns="" xmlns:ma14="http://schemas.microsoft.com/office/mac/drawingml/2011/main" val="1"/>
             </a:ext>
           </a:extLst>
         </p:spPr>
@@ -23499,14 +23506,14 @@
           <a:effectLst/>
           <a:extLst>
             <a:ext uri="{909E8E84-426E-40dd-AFC4-6F175D3DCCD1}">
-              <a14:hiddenFill xmlns:a14="http://schemas.microsoft.com/office/drawing/2010/main" xmlns="">
+              <a14:hiddenFill xmlns="" xmlns:a14="http://schemas.microsoft.com/office/drawing/2010/main">
                 <a:solidFill>
                   <a:schemeClr val="accent1"/>
                 </a:solidFill>
               </a14:hiddenFill>
             </a:ext>
             <a:ext uri="{91240B29-F687-4f45-9708-019B960494DF}">
-              <a14:hiddenLine xmlns:a14="http://schemas.microsoft.com/office/drawing/2010/main" xmlns="" w="9525">
+              <a14:hiddenLine xmlns="" xmlns:a14="http://schemas.microsoft.com/office/drawing/2010/main" w="9525">
                 <a:solidFill>
                   <a:schemeClr val="tx1"/>
                 </a:solidFill>
@@ -23516,7 +23523,7 @@
               </a14:hiddenLine>
             </a:ext>
             <a:ext uri="{AF507438-7753-43e0-B8FC-AC1667EBCBE1}">
-              <a14:hiddenEffects xmlns:a14="http://schemas.microsoft.com/office/drawing/2010/main" xmlns="">
+              <a14:hiddenEffects xmlns="" xmlns:a14="http://schemas.microsoft.com/office/drawing/2010/main">
                 <a:effectLst>
                   <a:outerShdw blurRad="63500" dist="38099" dir="2700000" algn="ctr" rotWithShape="0">
                     <a:schemeClr val="bg2">
@@ -23527,7 +23534,7 @@
               </a14:hiddenEffects>
             </a:ext>
             <a:ext uri="{FAA26D3D-D897-4be2-8F04-BA451C77F1D7}">
-              <ma14:placeholderFlag xmlns:ma14="http://schemas.microsoft.com/office/mac/drawingml/2011/main" xmlns="" val="1"/>
+              <ma14:placeholderFlag xmlns="" xmlns:ma14="http://schemas.microsoft.com/office/mac/drawingml/2011/main" val="1"/>
             </a:ext>
           </a:extLst>
         </p:spPr>
@@ -23743,14 +23750,14 @@
           <a:effectLst/>
           <a:extLst>
             <a:ext uri="{909E8E84-426E-40dd-AFC4-6F175D3DCCD1}">
-              <a14:hiddenFill xmlns:a14="http://schemas.microsoft.com/office/drawing/2010/main" xmlns="">
+              <a14:hiddenFill xmlns="" xmlns:a14="http://schemas.microsoft.com/office/drawing/2010/main">
                 <a:solidFill>
                   <a:schemeClr val="accent1"/>
                 </a:solidFill>
               </a14:hiddenFill>
             </a:ext>
             <a:ext uri="{91240B29-F687-4f45-9708-019B960494DF}">
-              <a14:hiddenLine xmlns:a14="http://schemas.microsoft.com/office/drawing/2010/main" xmlns="" w="9525">
+              <a14:hiddenLine xmlns="" xmlns:a14="http://schemas.microsoft.com/office/drawing/2010/main" w="9525">
                 <a:solidFill>
                   <a:schemeClr val="tx1"/>
                 </a:solidFill>
@@ -23760,7 +23767,7 @@
               </a14:hiddenLine>
             </a:ext>
             <a:ext uri="{AF507438-7753-43e0-B8FC-AC1667EBCBE1}">
-              <a14:hiddenEffects xmlns:a14="http://schemas.microsoft.com/office/drawing/2010/main" xmlns="">
+              <a14:hiddenEffects xmlns="" xmlns:a14="http://schemas.microsoft.com/office/drawing/2010/main">
                 <a:effectLst>
                   <a:outerShdw blurRad="63500" dist="38099" dir="2700000" algn="ctr" rotWithShape="0">
                     <a:schemeClr val="bg2">
@@ -23771,7 +23778,7 @@
               </a14:hiddenEffects>
             </a:ext>
             <a:ext uri="{FAA26D3D-D897-4be2-8F04-BA451C77F1D7}">
-              <ma14:placeholderFlag xmlns:ma14="http://schemas.microsoft.com/office/mac/drawingml/2011/main" xmlns="" val="1"/>
+              <ma14:placeholderFlag xmlns="" xmlns:ma14="http://schemas.microsoft.com/office/mac/drawingml/2011/main" val="1"/>
             </a:ext>
           </a:extLst>
         </p:spPr>
@@ -23960,14 +23967,14 @@
           <a:effectLst/>
           <a:extLst>
             <a:ext uri="{909E8E84-426E-40dd-AFC4-6F175D3DCCD1}">
-              <a14:hiddenFill xmlns:a14="http://schemas.microsoft.com/office/drawing/2010/main" xmlns="">
+              <a14:hiddenFill xmlns="" xmlns:a14="http://schemas.microsoft.com/office/drawing/2010/main">
                 <a:solidFill>
                   <a:schemeClr val="accent1"/>
                 </a:solidFill>
               </a14:hiddenFill>
             </a:ext>
             <a:ext uri="{91240B29-F687-4f45-9708-019B960494DF}">
-              <a14:hiddenLine xmlns:a14="http://schemas.microsoft.com/office/drawing/2010/main" xmlns="" w="9525">
+              <a14:hiddenLine xmlns="" xmlns:a14="http://schemas.microsoft.com/office/drawing/2010/main" w="9525">
                 <a:solidFill>
                   <a:schemeClr val="tx1"/>
                 </a:solidFill>
@@ -23977,7 +23984,7 @@
               </a14:hiddenLine>
             </a:ext>
             <a:ext uri="{AF507438-7753-43e0-B8FC-AC1667EBCBE1}">
-              <a14:hiddenEffects xmlns:a14="http://schemas.microsoft.com/office/drawing/2010/main" xmlns="">
+              <a14:hiddenEffects xmlns="" xmlns:a14="http://schemas.microsoft.com/office/drawing/2010/main">
                 <a:effectLst>
                   <a:outerShdw blurRad="63500" dist="38099" dir="2700000" algn="ctr" rotWithShape="0">
                     <a:schemeClr val="bg2">
@@ -23988,7 +23995,7 @@
               </a14:hiddenEffects>
             </a:ext>
             <a:ext uri="{FAA26D3D-D897-4be2-8F04-BA451C77F1D7}">
-              <ma14:placeholderFlag xmlns:ma14="http://schemas.microsoft.com/office/mac/drawingml/2011/main" xmlns="" val="1"/>
+              <ma14:placeholderFlag xmlns="" xmlns:ma14="http://schemas.microsoft.com/office/mac/drawingml/2011/main" val="1"/>
             </a:ext>
           </a:extLst>
         </p:spPr>
@@ -24204,14 +24211,14 @@
           <a:effectLst/>
           <a:extLst>
             <a:ext uri="{909E8E84-426E-40dd-AFC4-6F175D3DCCD1}">
-              <a14:hiddenFill xmlns:a14="http://schemas.microsoft.com/office/drawing/2010/main" xmlns="">
+              <a14:hiddenFill xmlns="" xmlns:a14="http://schemas.microsoft.com/office/drawing/2010/main">
                 <a:solidFill>
                   <a:schemeClr val="accent1"/>
                 </a:solidFill>
               </a14:hiddenFill>
             </a:ext>
             <a:ext uri="{91240B29-F687-4f45-9708-019B960494DF}">
-              <a14:hiddenLine xmlns:a14="http://schemas.microsoft.com/office/drawing/2010/main" xmlns="" w="9525">
+              <a14:hiddenLine xmlns="" xmlns:a14="http://schemas.microsoft.com/office/drawing/2010/main" w="9525">
                 <a:solidFill>
                   <a:schemeClr val="tx1"/>
                 </a:solidFill>
@@ -24221,7 +24228,7 @@
               </a14:hiddenLine>
             </a:ext>
             <a:ext uri="{AF507438-7753-43e0-B8FC-AC1667EBCBE1}">
-              <a14:hiddenEffects xmlns:a14="http://schemas.microsoft.com/office/drawing/2010/main" xmlns="">
+              <a14:hiddenEffects xmlns="" xmlns:a14="http://schemas.microsoft.com/office/drawing/2010/main">
                 <a:effectLst>
                   <a:outerShdw blurRad="63500" dist="38099" dir="2700000" algn="ctr" rotWithShape="0">
                     <a:schemeClr val="bg2">
@@ -24232,7 +24239,7 @@
               </a14:hiddenEffects>
             </a:ext>
             <a:ext uri="{FAA26D3D-D897-4be2-8F04-BA451C77F1D7}">
-              <ma14:placeholderFlag xmlns:ma14="http://schemas.microsoft.com/office/mac/drawingml/2011/main" xmlns="" val="1"/>
+              <ma14:placeholderFlag xmlns="" xmlns:ma14="http://schemas.microsoft.com/office/mac/drawingml/2011/main" val="1"/>
             </a:ext>
           </a:extLst>
         </p:spPr>
@@ -25044,14 +25051,14 @@
           <a:effectLst/>
           <a:extLst>
             <a:ext uri="{909E8E84-426E-40dd-AFC4-6F175D3DCCD1}">
-              <a14:hiddenFill xmlns:a14="http://schemas.microsoft.com/office/drawing/2010/main" xmlns="">
+              <a14:hiddenFill xmlns="" xmlns:a14="http://schemas.microsoft.com/office/drawing/2010/main">
                 <a:solidFill>
                   <a:schemeClr val="accent1"/>
                 </a:solidFill>
               </a14:hiddenFill>
             </a:ext>
             <a:ext uri="{91240B29-F687-4f45-9708-019B960494DF}">
-              <a14:hiddenLine xmlns:a14="http://schemas.microsoft.com/office/drawing/2010/main" xmlns="" w="9525">
+              <a14:hiddenLine xmlns="" xmlns:a14="http://schemas.microsoft.com/office/drawing/2010/main" w="9525">
                 <a:solidFill>
                   <a:schemeClr val="tx1"/>
                 </a:solidFill>
@@ -25061,7 +25068,7 @@
               </a14:hiddenLine>
             </a:ext>
             <a:ext uri="{AF507438-7753-43e0-B8FC-AC1667EBCBE1}">
-              <a14:hiddenEffects xmlns:a14="http://schemas.microsoft.com/office/drawing/2010/main" xmlns="">
+              <a14:hiddenEffects xmlns="" xmlns:a14="http://schemas.microsoft.com/office/drawing/2010/main">
                 <a:effectLst>
                   <a:outerShdw blurRad="63500" dist="38099" dir="2700000" algn="ctr" rotWithShape="0">
                     <a:schemeClr val="bg2">
@@ -25072,7 +25079,7 @@
               </a14:hiddenEffects>
             </a:ext>
             <a:ext uri="{FAA26D3D-D897-4be2-8F04-BA451C77F1D7}">
-              <ma14:placeholderFlag xmlns:ma14="http://schemas.microsoft.com/office/mac/drawingml/2011/main" xmlns="" val="1"/>
+              <ma14:placeholderFlag xmlns="" xmlns:ma14="http://schemas.microsoft.com/office/mac/drawingml/2011/main" val="1"/>
             </a:ext>
           </a:extLst>
         </p:spPr>
@@ -25261,14 +25268,14 @@
           <a:effectLst/>
           <a:extLst>
             <a:ext uri="{909E8E84-426E-40dd-AFC4-6F175D3DCCD1}">
-              <a14:hiddenFill xmlns:a14="http://schemas.microsoft.com/office/drawing/2010/main" xmlns="">
+              <a14:hiddenFill xmlns="" xmlns:a14="http://schemas.microsoft.com/office/drawing/2010/main">
                 <a:solidFill>
                   <a:schemeClr val="accent1"/>
                 </a:solidFill>
               </a14:hiddenFill>
             </a:ext>
             <a:ext uri="{91240B29-F687-4f45-9708-019B960494DF}">
-              <a14:hiddenLine xmlns:a14="http://schemas.microsoft.com/office/drawing/2010/main" xmlns="" w="9525">
+              <a14:hiddenLine xmlns="" xmlns:a14="http://schemas.microsoft.com/office/drawing/2010/main" w="9525">
                 <a:solidFill>
                   <a:schemeClr val="tx1"/>
                 </a:solidFill>
@@ -25278,7 +25285,7 @@
               </a14:hiddenLine>
             </a:ext>
             <a:ext uri="{AF507438-7753-43e0-B8FC-AC1667EBCBE1}">
-              <a14:hiddenEffects xmlns:a14="http://schemas.microsoft.com/office/drawing/2010/main" xmlns="">
+              <a14:hiddenEffects xmlns="" xmlns:a14="http://schemas.microsoft.com/office/drawing/2010/main">
                 <a:effectLst>
                   <a:outerShdw blurRad="63500" dist="38099" dir="2700000" algn="ctr" rotWithShape="0">
                     <a:schemeClr val="bg2">
@@ -25289,7 +25296,7 @@
               </a14:hiddenEffects>
             </a:ext>
             <a:ext uri="{FAA26D3D-D897-4be2-8F04-BA451C77F1D7}">
-              <ma14:placeholderFlag xmlns:ma14="http://schemas.microsoft.com/office/mac/drawingml/2011/main" xmlns="" val="1"/>
+              <ma14:placeholderFlag xmlns="" xmlns:ma14="http://schemas.microsoft.com/office/mac/drawingml/2011/main" val="1"/>
             </a:ext>
           </a:extLst>
         </p:spPr>
@@ -27814,14 +27821,7 @@
           <a:p>
             <a:r>
               <a:rPr lang="en-US" dirty="0"/>
-              <a:t>Problem: you want to have a feature which holds </a:t>
-            </a:r>
-            <a:br>
-              <a:rPr lang="en-US" dirty="0"/>
-            </a:br>
-            <a:r>
-              <a:rPr lang="en-US" dirty="0"/>
-              <a:t>a set of Feature Structures.</a:t>
+              <a:t>A feature which holds a set of Feature Structures.</a:t>
             </a:r>
           </a:p>
           <a:p>
@@ -27834,8 +27834,11 @@
           <a:p>
             <a:r>
               <a:rPr lang="en-US" dirty="0"/>
-              <a:t>Solution: use the new (semi)built-in type </a:t>
-            </a:r>
+              <a:t>Use the new (semi)built-in type </a:t>
+            </a:r>
+          </a:p>
+          <a:p>
+            <a:pPr lvl="1"/>
             <a:r>
               <a:rPr lang="en-US" dirty="0" err="1">
                 <a:highlight>
@@ -27845,6 +27848,26 @@
                 <a:cs typeface="Courier New" panose="02070309020205020404" pitchFamily="49" charset="0"/>
               </a:rPr>
               <a:t>FSHashSet</a:t>
+            </a:r>
+            <a:r>
+              <a:rPr lang="en-US" dirty="0">
+                <a:highlight>
+                  <a:srgbClr val="00FF00"/>
+                </a:highlight>
+                <a:latin typeface="Courier New" panose="02070309020205020404" pitchFamily="49" charset="0"/>
+                <a:cs typeface="Courier New" panose="02070309020205020404" pitchFamily="49" charset="0"/>
+              </a:rPr>
+              <a:t>, or </a:t>
+            </a:r>
+            <a:r>
+              <a:rPr lang="en-US" dirty="0" err="1">
+                <a:highlight>
+                  <a:srgbClr val="00FF00"/>
+                </a:highlight>
+                <a:latin typeface="Courier New" panose="02070309020205020404" pitchFamily="49" charset="0"/>
+                <a:cs typeface="Courier New" panose="02070309020205020404" pitchFamily="49" charset="0"/>
+              </a:rPr>
+              <a:t>FSLinkedHashSet</a:t>
             </a:r>
             <a:endParaRPr lang="en-US" dirty="0">
               <a:highlight>
@@ -28132,6 +28155,37 @@
                                           <p:spTgt spid="3">
                                             <p:txEl>
                                               <p:pRg st="5" end="5"/>
+                                            </p:txEl>
+                                          </p:spTgt>
+                                        </p:tgtEl>
+                                        <p:attrNameLst>
+                                          <p:attrName>style.visibility</p:attrName>
+                                        </p:attrNameLst>
+                                      </p:cBhvr>
+                                      <p:to>
+                                        <p:strVal val="visible"/>
+                                      </p:to>
+                                    </p:set>
+                                  </p:childTnLst>
+                                </p:cTn>
+                              </p:par>
+                              <p:par>
+                                <p:cTn id="15" presetID="1" presetClass="entr" presetSubtype="0" fill="hold" grpId="0" nodeType="withEffect">
+                                  <p:stCondLst>
+                                    <p:cond delay="0"/>
+                                  </p:stCondLst>
+                                  <p:childTnLst>
+                                    <p:set>
+                                      <p:cBhvr>
+                                        <p:cTn id="16" dur="1" fill="hold">
+                                          <p:stCondLst>
+                                            <p:cond delay="0"/>
+                                          </p:stCondLst>
+                                        </p:cTn>
+                                        <p:tgtEl>
+                                          <p:spTgt spid="3">
+                                            <p:txEl>
+                                              <p:pRg st="6" end="6"/>
                                             </p:txEl>
                                           </p:spTgt>
                                         </p:tgtEl>
@@ -33550,26 +33604,39 @@
                                   </p:childTnLst>
                                 </p:cTn>
                               </p:par>
-                            </p:childTnLst>
-                          </p:cTn>
-                        </p:par>
-                      </p:childTnLst>
-                    </p:cTn>
-                  </p:par>
-                  <p:par>
-                    <p:cTn id="13" fill="hold">
-                      <p:stCondLst>
-                        <p:cond delay="indefinite"/>
-                      </p:stCondLst>
-                      <p:childTnLst>
-                        <p:par>
-                          <p:cTn id="14" fill="hold">
-                            <p:stCondLst>
-                              <p:cond delay="0"/>
-                            </p:stCondLst>
-                            <p:childTnLst>
                               <p:par>
-                                <p:cTn id="15" presetID="1" presetClass="entr" presetSubtype="0" fill="hold" nodeType="clickEffect">
+                                <p:cTn id="13" presetID="1" presetClass="entr" presetSubtype="0" fill="hold" nodeType="withEffect">
+                                  <p:stCondLst>
+                                    <p:cond delay="0"/>
+                                  </p:stCondLst>
+                                  <p:childTnLst>
+                                    <p:set>
+                                      <p:cBhvr>
+                                        <p:cTn id="14" dur="1" fill="hold">
+                                          <p:stCondLst>
+                                            <p:cond delay="0"/>
+                                          </p:stCondLst>
+                                        </p:cTn>
+                                        <p:tgtEl>
+                                          <p:spTgt spid="3">
+                                            <p:txEl>
+                                              <p:pRg st="4" end="4"/>
+                                            </p:txEl>
+                                          </p:spTgt>
+                                        </p:tgtEl>
+                                        <p:attrNameLst>
+                                          <p:attrName>style.visibility</p:attrName>
+                                        </p:attrNameLst>
+                                      </p:cBhvr>
+                                      <p:to>
+                                        <p:strVal val="visible"/>
+                                      </p:to>
+                                    </p:set>
+                                  </p:childTnLst>
+                                </p:cTn>
+                              </p:par>
+                              <p:par>
+                                <p:cTn id="15" presetID="1" presetClass="entr" presetSubtype="0" fill="hold" nodeType="withEffect">
                                   <p:stCondLst>
                                     <p:cond delay="0"/>
                                   </p:stCondLst>
@@ -33584,7 +33651,7 @@
                                         <p:tgtEl>
                                           <p:spTgt spid="3">
                                             <p:txEl>
-                                              <p:pRg st="4" end="4"/>
+                                              <p:pRg st="5" end="5"/>
                                             </p:txEl>
                                           </p:spTgt>
                                         </p:tgtEl>
@@ -33615,7 +33682,7 @@
                                         <p:tgtEl>
                                           <p:spTgt spid="3">
                                             <p:txEl>
-                                              <p:pRg st="5" end="5"/>
+                                              <p:pRg st="6" end="6"/>
                                             </p:txEl>
                                           </p:spTgt>
                                         </p:tgtEl>
@@ -33646,37 +33713,6 @@
                                         <p:tgtEl>
                                           <p:spTgt spid="3">
                                             <p:txEl>
-                                              <p:pRg st="6" end="6"/>
-                                            </p:txEl>
-                                          </p:spTgt>
-                                        </p:tgtEl>
-                                        <p:attrNameLst>
-                                          <p:attrName>style.visibility</p:attrName>
-                                        </p:attrNameLst>
-                                      </p:cBhvr>
-                                      <p:to>
-                                        <p:strVal val="visible"/>
-                                      </p:to>
-                                    </p:set>
-                                  </p:childTnLst>
-                                </p:cTn>
-                              </p:par>
-                              <p:par>
-                                <p:cTn id="21" presetID="1" presetClass="entr" presetSubtype="0" fill="hold" nodeType="withEffect">
-                                  <p:stCondLst>
-                                    <p:cond delay="0"/>
-                                  </p:stCondLst>
-                                  <p:childTnLst>
-                                    <p:set>
-                                      <p:cBhvr>
-                                        <p:cTn id="22" dur="1" fill="hold">
-                                          <p:stCondLst>
-                                            <p:cond delay="0"/>
-                                          </p:stCondLst>
-                                        </p:cTn>
-                                        <p:tgtEl>
-                                          <p:spTgt spid="3">
-                                            <p:txEl>
                                               <p:pRg st="7" end="7"/>
                                             </p:txEl>
                                           </p:spTgt>
@@ -33699,26 +33735,26 @@
                     </p:cTn>
                   </p:par>
                   <p:par>
-                    <p:cTn id="23" fill="hold">
+                    <p:cTn id="21" fill="hold">
                       <p:stCondLst>
                         <p:cond delay="indefinite"/>
                       </p:stCondLst>
                       <p:childTnLst>
                         <p:par>
-                          <p:cTn id="24" fill="hold">
+                          <p:cTn id="22" fill="hold">
                             <p:stCondLst>
                               <p:cond delay="0"/>
                             </p:stCondLst>
                             <p:childTnLst>
                               <p:par>
-                                <p:cTn id="25" presetID="1" presetClass="entr" presetSubtype="0" fill="hold" nodeType="clickEffect">
+                                <p:cTn id="23" presetID="1" presetClass="entr" presetSubtype="0" fill="hold" nodeType="clickEffect">
                                   <p:stCondLst>
                                     <p:cond delay="0"/>
                                   </p:stCondLst>
                                   <p:childTnLst>
                                     <p:set>
                                       <p:cBhvr>
-                                        <p:cTn id="26" dur="1" fill="hold">
+                                        <p:cTn id="24" dur="1" fill="hold">
                                           <p:stCondLst>
                                             <p:cond delay="0"/>
                                           </p:stCondLst>
@@ -33742,14 +33778,14 @@
                                 </p:cTn>
                               </p:par>
                               <p:par>
-                                <p:cTn id="27" presetID="1" presetClass="entr" presetSubtype="0" fill="hold" nodeType="withEffect">
+                                <p:cTn id="25" presetID="1" presetClass="entr" presetSubtype="0" fill="hold" nodeType="withEffect">
                                   <p:stCondLst>
                                     <p:cond delay="0"/>
                                   </p:stCondLst>
                                   <p:childTnLst>
                                     <p:set>
                                       <p:cBhvr>
-                                        <p:cTn id="28" dur="1" fill="hold">
+                                        <p:cTn id="26" dur="1" fill="hold">
                                           <p:stCondLst>
                                             <p:cond delay="0"/>
                                           </p:stCondLst>
@@ -36497,14 +36533,14 @@
           </a:xfrm>
           <a:extLst>
             <a:ext uri="{909E8E84-426E-40dd-AFC4-6F175D3DCCD1}">
-              <a14:hiddenFill xmlns:a14="http://schemas.microsoft.com/office/drawing/2010/main" xmlns="">
+              <a14:hiddenFill xmlns="" xmlns:a14="http://schemas.microsoft.com/office/drawing/2010/main">
                 <a:solidFill>
                   <a:schemeClr val="accent1"/>
                 </a:solidFill>
               </a14:hiddenFill>
             </a:ext>
             <a:ext uri="{91240B29-F687-4f45-9708-019B960494DF}">
-              <a14:hiddenLine xmlns:a14="http://schemas.microsoft.com/office/drawing/2010/main" xmlns="" w="9525">
+              <a14:hiddenLine xmlns="" xmlns:a14="http://schemas.microsoft.com/office/drawing/2010/main" w="9525">
                 <a:solidFill>
                   <a:schemeClr val="tx1"/>
                 </a:solidFill>
@@ -36514,7 +36550,7 @@
               </a14:hiddenLine>
             </a:ext>
             <a:ext uri="{AF507438-7753-43e0-B8FC-AC1667EBCBE1}">
-              <a14:hiddenEffects xmlns:a14="http://schemas.microsoft.com/office/drawing/2010/main" xmlns="">
+              <a14:hiddenEffects xmlns="" xmlns:a14="http://schemas.microsoft.com/office/drawing/2010/main">
                 <a:effectLst>
                   <a:outerShdw blurRad="63500" dist="38099" dir="2700000" algn="ctr" rotWithShape="0">
                     <a:schemeClr val="bg2">
@@ -36525,7 +36561,7 @@
               </a14:hiddenEffects>
             </a:ext>
             <a:ext uri="{FAA26D3D-D897-4be2-8F04-BA451C77F1D7}">
-              <ma14:placeholderFlag xmlns:ma14="http://schemas.microsoft.com/office/mac/drawingml/2011/main" xmlns="" val="1"/>
+              <ma14:placeholderFlag xmlns="" xmlns:ma14="http://schemas.microsoft.com/office/mac/drawingml/2011/main" val="1"/>
             </a:ext>
           </a:extLst>
         </p:spPr>
@@ -36668,14 +36704,14 @@
         <p:spPr>
           <a:extLst>
             <a:ext uri="{909E8E84-426E-40dd-AFC4-6F175D3DCCD1}">
-              <a14:hiddenFill xmlns:a14="http://schemas.microsoft.com/office/drawing/2010/main" xmlns="">
+              <a14:hiddenFill xmlns="" xmlns:a14="http://schemas.microsoft.com/office/drawing/2010/main">
                 <a:solidFill>
                   <a:schemeClr val="accent1"/>
                 </a:solidFill>
               </a14:hiddenFill>
             </a:ext>
             <a:ext uri="{91240B29-F687-4f45-9708-019B960494DF}">
-              <a14:hiddenLine xmlns:a14="http://schemas.microsoft.com/office/drawing/2010/main" xmlns="" w="9525">
+              <a14:hiddenLine xmlns="" xmlns:a14="http://schemas.microsoft.com/office/drawing/2010/main" w="9525">
                 <a:solidFill>
                   <a:schemeClr val="tx1"/>
                 </a:solidFill>
@@ -36685,7 +36721,7 @@
               </a14:hiddenLine>
             </a:ext>
             <a:ext uri="{AF507438-7753-43e0-B8FC-AC1667EBCBE1}">
-              <a14:hiddenEffects xmlns:a14="http://schemas.microsoft.com/office/drawing/2010/main" xmlns="">
+              <a14:hiddenEffects xmlns="" xmlns:a14="http://schemas.microsoft.com/office/drawing/2010/main">
                 <a:effectLst>
                   <a:outerShdw blurRad="63500" dist="38099" dir="2700000" algn="ctr" rotWithShape="0">
                     <a:schemeClr val="bg2">
@@ -36696,7 +36732,7 @@
               </a14:hiddenEffects>
             </a:ext>
             <a:ext uri="{FAA26D3D-D897-4be2-8F04-BA451C77F1D7}">
-              <ma14:placeholderFlag xmlns:ma14="http://schemas.microsoft.com/office/mac/drawingml/2011/main" xmlns="" val="1"/>
+              <ma14:placeholderFlag xmlns="" xmlns:ma14="http://schemas.microsoft.com/office/mac/drawingml/2011/main" val="1"/>
             </a:ext>
           </a:extLst>
         </p:spPr>
@@ -37974,7 +38010,7 @@
               <a:rPr lang="en-US" dirty="0">
                 <a:cs typeface="Courier New" panose="02070309020205020404" pitchFamily="49" charset="0"/>
               </a:rPr>
-              <a:t>UIMA objects integrated into Java Idioms, with generic types supporting type inferencing</a:t>
+              <a:t>UIMA objects integrated into Java idioms, with generic types supporting type inferencing</a:t>
             </a:r>
             <a:endParaRPr lang="en-US" dirty="0">
               <a:latin typeface="Courier New" panose="02070309020205020404" pitchFamily="49" charset="0"/>
@@ -43321,14 +43357,14 @@
           <a:effectLst/>
           <a:extLst>
             <a:ext uri="{909E8E84-426E-40dd-AFC4-6F175D3DCCD1}">
-              <a14:hiddenFill xmlns:a14="http://schemas.microsoft.com/office/drawing/2010/main" xmlns="">
+              <a14:hiddenFill xmlns="" xmlns:a14="http://schemas.microsoft.com/office/drawing/2010/main">
                 <a:solidFill>
                   <a:schemeClr val="accent1"/>
                 </a:solidFill>
               </a14:hiddenFill>
             </a:ext>
             <a:ext uri="{91240B29-F687-4f45-9708-019B960494DF}">
-              <a14:hiddenLine xmlns:a14="http://schemas.microsoft.com/office/drawing/2010/main" xmlns="" w="9525">
+              <a14:hiddenLine xmlns="" xmlns:a14="http://schemas.microsoft.com/office/drawing/2010/main" w="9525">
                 <a:solidFill>
                   <a:schemeClr val="tx1"/>
                 </a:solidFill>
@@ -43338,7 +43374,7 @@
               </a14:hiddenLine>
             </a:ext>
             <a:ext uri="{AF507438-7753-43e0-B8FC-AC1667EBCBE1}">
-              <a14:hiddenEffects xmlns:a14="http://schemas.microsoft.com/office/drawing/2010/main" xmlns="">
+              <a14:hiddenEffects xmlns="" xmlns:a14="http://schemas.microsoft.com/office/drawing/2010/main">
                 <a:effectLst>
                   <a:outerShdw blurRad="63500" dist="38099" dir="2700000" algn="ctr" rotWithShape="0">
                     <a:schemeClr val="bg2">
@@ -43349,7 +43385,7 @@
               </a14:hiddenEffects>
             </a:ext>
             <a:ext uri="{FAA26D3D-D897-4be2-8F04-BA451C77F1D7}">
-              <ma14:placeholderFlag xmlns:ma14="http://schemas.microsoft.com/office/mac/drawingml/2011/main" xmlns="" val="1"/>
+              <ma14:placeholderFlag xmlns="" xmlns:ma14="http://schemas.microsoft.com/office/mac/drawingml/2011/main" val="1"/>
             </a:ext>
           </a:extLst>
         </p:spPr>
@@ -43538,14 +43574,14 @@
           <a:effectLst/>
           <a:extLst>
             <a:ext uri="{909E8E84-426E-40dd-AFC4-6F175D3DCCD1}">
-              <a14:hiddenFill xmlns:a14="http://schemas.microsoft.com/office/drawing/2010/main" xmlns="">
+              <a14:hiddenFill xmlns="" xmlns:a14="http://schemas.microsoft.com/office/drawing/2010/main">
                 <a:solidFill>
                   <a:schemeClr val="accent1"/>
                 </a:solidFill>
               </a14:hiddenFill>
             </a:ext>
             <a:ext uri="{91240B29-F687-4f45-9708-019B960494DF}">
-              <a14:hiddenLine xmlns:a14="http://schemas.microsoft.com/office/drawing/2010/main" xmlns="" w="9525">
+              <a14:hiddenLine xmlns="" xmlns:a14="http://schemas.microsoft.com/office/drawing/2010/main" w="9525">
                 <a:solidFill>
                   <a:schemeClr val="tx1"/>
                 </a:solidFill>
@@ -43555,7 +43591,7 @@
               </a14:hiddenLine>
             </a:ext>
             <a:ext uri="{AF507438-7753-43e0-B8FC-AC1667EBCBE1}">
-              <a14:hiddenEffects xmlns:a14="http://schemas.microsoft.com/office/drawing/2010/main" xmlns="">
+              <a14:hiddenEffects xmlns="" xmlns:a14="http://schemas.microsoft.com/office/drawing/2010/main">
                 <a:effectLst>
                   <a:outerShdw blurRad="63500" dist="38099" dir="2700000" algn="ctr" rotWithShape="0">
                     <a:schemeClr val="bg2">
@@ -43566,7 +43602,7 @@
               </a14:hiddenEffects>
             </a:ext>
             <a:ext uri="{FAA26D3D-D897-4be2-8F04-BA451C77F1D7}">
-              <ma14:placeholderFlag xmlns:ma14="http://schemas.microsoft.com/office/mac/drawingml/2011/main" xmlns="" val="1"/>
+              <ma14:placeholderFlag xmlns="" xmlns:ma14="http://schemas.microsoft.com/office/mac/drawingml/2011/main" val="1"/>
             </a:ext>
           </a:extLst>
         </p:spPr>
@@ -43775,14 +43811,14 @@
           <a:effectLst/>
           <a:extLst>
             <a:ext uri="{909E8E84-426E-40dd-AFC4-6F175D3DCCD1}">
-              <a14:hiddenFill xmlns:a14="http://schemas.microsoft.com/office/drawing/2010/main" xmlns="">
+              <a14:hiddenFill xmlns="" xmlns:a14="http://schemas.microsoft.com/office/drawing/2010/main">
                 <a:solidFill>
                   <a:schemeClr val="accent1"/>
                 </a:solidFill>
               </a14:hiddenFill>
             </a:ext>
             <a:ext uri="{91240B29-F687-4f45-9708-019B960494DF}">
-              <a14:hiddenLine xmlns:a14="http://schemas.microsoft.com/office/drawing/2010/main" xmlns="" w="9525">
+              <a14:hiddenLine xmlns="" xmlns:a14="http://schemas.microsoft.com/office/drawing/2010/main" w="9525">
                 <a:solidFill>
                   <a:schemeClr val="tx1"/>
                 </a:solidFill>
@@ -43792,7 +43828,7 @@
               </a14:hiddenLine>
             </a:ext>
             <a:ext uri="{AF507438-7753-43e0-B8FC-AC1667EBCBE1}">
-              <a14:hiddenEffects xmlns:a14="http://schemas.microsoft.com/office/drawing/2010/main" xmlns="">
+              <a14:hiddenEffects xmlns="" xmlns:a14="http://schemas.microsoft.com/office/drawing/2010/main">
                 <a:effectLst>
                   <a:outerShdw blurRad="63500" dist="38099" dir="2700000" algn="ctr" rotWithShape="0">
                     <a:schemeClr val="bg2">
@@ -43803,7 +43839,7 @@
               </a14:hiddenEffects>
             </a:ext>
             <a:ext uri="{FAA26D3D-D897-4be2-8F04-BA451C77F1D7}">
-              <ma14:placeholderFlag xmlns:ma14="http://schemas.microsoft.com/office/mac/drawingml/2011/main" xmlns="" val="1"/>
+              <ma14:placeholderFlag xmlns="" xmlns:ma14="http://schemas.microsoft.com/office/mac/drawingml/2011/main" val="1"/>
             </a:ext>
           </a:extLst>
         </p:spPr>
@@ -43992,14 +44028,14 @@
           <a:effectLst/>
           <a:extLst>
             <a:ext uri="{909E8E84-426E-40dd-AFC4-6F175D3DCCD1}">
-              <a14:hiddenFill xmlns:a14="http://schemas.microsoft.com/office/drawing/2010/main" xmlns="">
+              <a14:hiddenFill xmlns="" xmlns:a14="http://schemas.microsoft.com/office/drawing/2010/main">
                 <a:solidFill>
                   <a:schemeClr val="accent1"/>
                 </a:solidFill>
               </a14:hiddenFill>
             </a:ext>
             <a:ext uri="{91240B29-F687-4f45-9708-019B960494DF}">
-              <a14:hiddenLine xmlns:a14="http://schemas.microsoft.com/office/drawing/2010/main" xmlns="" w="9525">
+              <a14:hiddenLine xmlns="" xmlns:a14="http://schemas.microsoft.com/office/drawing/2010/main" w="9525">
                 <a:solidFill>
                   <a:schemeClr val="tx1"/>
                 </a:solidFill>
@@ -44009,7 +44045,7 @@
               </a14:hiddenLine>
             </a:ext>
             <a:ext uri="{AF507438-7753-43e0-B8FC-AC1667EBCBE1}">
-              <a14:hiddenEffects xmlns:a14="http://schemas.microsoft.com/office/drawing/2010/main" xmlns="">
+              <a14:hiddenEffects xmlns="" xmlns:a14="http://schemas.microsoft.com/office/drawing/2010/main">
                 <a:effectLst>
                   <a:outerShdw blurRad="63500" dist="38099" dir="2700000" algn="ctr" rotWithShape="0">
                     <a:schemeClr val="bg2">
@@ -44020,7 +44056,7 @@
               </a14:hiddenEffects>
             </a:ext>
             <a:ext uri="{FAA26D3D-D897-4be2-8F04-BA451C77F1D7}">
-              <ma14:placeholderFlag xmlns:ma14="http://schemas.microsoft.com/office/mac/drawingml/2011/main" xmlns="" val="1"/>
+              <ma14:placeholderFlag xmlns="" xmlns:ma14="http://schemas.microsoft.com/office/mac/drawingml/2011/main" val="1"/>
             </a:ext>
           </a:extLst>
         </p:spPr>
@@ -44243,14 +44279,14 @@
           <a:effectLst/>
           <a:extLst>
             <a:ext uri="{909E8E84-426E-40dd-AFC4-6F175D3DCCD1}">
-              <a14:hiddenFill xmlns:a14="http://schemas.microsoft.com/office/drawing/2010/main" xmlns="">
+              <a14:hiddenFill xmlns="" xmlns:a14="http://schemas.microsoft.com/office/drawing/2010/main">
                 <a:solidFill>
                   <a:schemeClr val="accent1"/>
                 </a:solidFill>
               </a14:hiddenFill>
             </a:ext>
             <a:ext uri="{91240B29-F687-4f45-9708-019B960494DF}">
-              <a14:hiddenLine xmlns:a14="http://schemas.microsoft.com/office/drawing/2010/main" xmlns="" w="9525">
+              <a14:hiddenLine xmlns="" xmlns:a14="http://schemas.microsoft.com/office/drawing/2010/main" w="9525">
                 <a:solidFill>
                   <a:schemeClr val="tx1"/>
                 </a:solidFill>
@@ -44260,7 +44296,7 @@
               </a14:hiddenLine>
             </a:ext>
             <a:ext uri="{AF507438-7753-43e0-B8FC-AC1667EBCBE1}">
-              <a14:hiddenEffects xmlns:a14="http://schemas.microsoft.com/office/drawing/2010/main" xmlns="">
+              <a14:hiddenEffects xmlns="" xmlns:a14="http://schemas.microsoft.com/office/drawing/2010/main">
                 <a:effectLst>
                   <a:outerShdw blurRad="63500" dist="38099" dir="2700000" algn="ctr" rotWithShape="0">
                     <a:schemeClr val="bg2">
@@ -44271,7 +44307,7 @@
               </a14:hiddenEffects>
             </a:ext>
             <a:ext uri="{FAA26D3D-D897-4be2-8F04-BA451C77F1D7}">
-              <ma14:placeholderFlag xmlns:ma14="http://schemas.microsoft.com/office/mac/drawingml/2011/main" xmlns="" val="1"/>
+              <ma14:placeholderFlag xmlns="" xmlns:ma14="http://schemas.microsoft.com/office/mac/drawingml/2011/main" val="1"/>
             </a:ext>
           </a:extLst>
         </p:spPr>

</xml_diff>